<commit_message>
last changes for presantation
</commit_message>
<xml_diff>
--- a/Abschlussvortrag.pptx
+++ b/Abschlussvortrag.pptx
@@ -3983,7 +3983,7 @@
       </p:grpSpPr>
       <p:sp>
         <p:nvSpPr>
-          <p:cNvPr id="393" name="Network Topology Configuration &amp; Verifying"/>
+          <p:cNvPr id="394" name="Network Topology Configuration &amp; Verifying"/>
           <p:cNvSpPr txBox="1"/>
           <p:nvPr>
             <p:ph type="title"/>
@@ -4015,7 +4015,7 @@
       </p:sp>
       <p:sp>
         <p:nvSpPr>
-          <p:cNvPr id="394" name="Slide Number"/>
+          <p:cNvPr id="395" name="Slide Number"/>
           <p:cNvSpPr txBox="1"/>
           <p:nvPr>
             <p:ph type="sldNum" sz="quarter" idx="4294967295"/>
@@ -4046,7 +4046,7 @@
       </p:sp>
       <p:sp>
         <p:nvSpPr>
-          <p:cNvPr id="395" name="Footer Placeholder 4"/>
+          <p:cNvPr id="396" name="Footer Placeholder 4"/>
           <p:cNvSpPr txBox="1"/>
           <p:nvPr/>
         </p:nvSpPr>
@@ -4088,7 +4088,7 @@
       </p:sp>
       <p:grpSp>
         <p:nvGrpSpPr>
-          <p:cNvPr id="398" name="Testbed"/>
+          <p:cNvPr id="399" name="Testbed"/>
           <p:cNvGrpSpPr/>
           <p:nvPr/>
         </p:nvGrpSpPr>
@@ -4102,7 +4102,7 @@
         </p:grpSpPr>
         <p:sp>
           <p:nvSpPr>
-            <p:cNvPr id="396" name="Shape"/>
+            <p:cNvPr id="397" name="Shape"/>
             <p:cNvSpPr/>
             <p:nvPr/>
           </p:nvSpPr>
@@ -4230,7 +4230,7 @@
         </p:sp>
         <p:sp>
           <p:nvSpPr>
-            <p:cNvPr id="397" name="Testbed"/>
+            <p:cNvPr id="398" name="Testbed"/>
             <p:cNvSpPr txBox="1"/>
             <p:nvPr/>
           </p:nvSpPr>
@@ -4274,7 +4274,7 @@
       </p:grpSp>
       <p:grpSp>
         <p:nvGrpSpPr>
-          <p:cNvPr id="401" name="netem"/>
+          <p:cNvPr id="402" name="netem"/>
           <p:cNvGrpSpPr/>
           <p:nvPr/>
         </p:nvGrpSpPr>
@@ -4288,7 +4288,7 @@
         </p:grpSpPr>
         <p:sp>
           <p:nvSpPr>
-            <p:cNvPr id="399" name="Rounded Rectangle"/>
+            <p:cNvPr id="400" name="Rounded Rectangle"/>
             <p:cNvSpPr/>
             <p:nvPr/>
           </p:nvSpPr>
@@ -4354,7 +4354,7 @@
         </p:sp>
         <p:sp>
           <p:nvSpPr>
-            <p:cNvPr id="400" name="netem"/>
+            <p:cNvPr id="401" name="netem"/>
             <p:cNvSpPr txBox="1"/>
             <p:nvPr/>
           </p:nvSpPr>
@@ -4402,7 +4402,7 @@
       </p:grpSp>
       <p:sp>
         <p:nvSpPr>
-          <p:cNvPr id="402" name="Rectangle"/>
+          <p:cNvPr id="403" name="Rectangle"/>
           <p:cNvSpPr/>
           <p:nvPr/>
         </p:nvSpPr>
@@ -4440,7 +4440,7 @@
       </p:sp>
       <p:grpSp>
         <p:nvGrpSpPr>
-          <p:cNvPr id="405" name="eth0"/>
+          <p:cNvPr id="406" name="eth0"/>
           <p:cNvGrpSpPr/>
           <p:nvPr/>
         </p:nvGrpSpPr>
@@ -4454,7 +4454,7 @@
         </p:grpSpPr>
         <p:sp>
           <p:nvSpPr>
-            <p:cNvPr id="403" name="Rectangle"/>
+            <p:cNvPr id="404" name="Rectangle"/>
             <p:cNvSpPr/>
             <p:nvPr/>
           </p:nvSpPr>
@@ -4502,7 +4502,7 @@
         </p:sp>
         <p:sp>
           <p:nvSpPr>
-            <p:cNvPr id="404" name="eth0"/>
+            <p:cNvPr id="405" name="eth0"/>
             <p:cNvSpPr txBox="1"/>
             <p:nvPr/>
           </p:nvSpPr>
@@ -4550,7 +4550,7 @@
       </p:grpSp>
       <p:sp>
         <p:nvSpPr>
-          <p:cNvPr id="406" name="bandwidth"/>
+          <p:cNvPr id="407" name="bandwidth"/>
           <p:cNvSpPr txBox="1"/>
           <p:nvPr/>
         </p:nvSpPr>
@@ -4601,7 +4601,7 @@
       </p:sp>
       <p:sp>
         <p:nvSpPr>
-          <p:cNvPr id="407" name="latency"/>
+          <p:cNvPr id="408" name="latency"/>
           <p:cNvSpPr txBox="1"/>
           <p:nvPr/>
         </p:nvSpPr>
@@ -4652,7 +4652,7 @@
       </p:sp>
       <p:sp>
         <p:nvSpPr>
-          <p:cNvPr id="408" name="packet loss"/>
+          <p:cNvPr id="409" name="packet loss"/>
           <p:cNvSpPr txBox="1"/>
           <p:nvPr/>
         </p:nvSpPr>
@@ -4703,7 +4703,7 @@
       </p:sp>
       <p:sp>
         <p:nvSpPr>
-          <p:cNvPr id="409" name="Line"/>
+          <p:cNvPr id="410" name="Line"/>
           <p:cNvSpPr/>
           <p:nvPr/>
         </p:nvSpPr>
@@ -4732,7 +4732,7 @@
       </p:sp>
       <p:sp>
         <p:nvSpPr>
-          <p:cNvPr id="410" name="Line"/>
+          <p:cNvPr id="411" name="Line"/>
           <p:cNvSpPr/>
           <p:nvPr/>
         </p:nvSpPr>
@@ -4761,7 +4761,7 @@
       </p:sp>
       <p:sp>
         <p:nvSpPr>
-          <p:cNvPr id="411" name="Line"/>
+          <p:cNvPr id="412" name="Line"/>
           <p:cNvSpPr/>
           <p:nvPr/>
         </p:nvSpPr>
@@ -4790,7 +4790,7 @@
       </p:sp>
       <p:sp>
         <p:nvSpPr>
-          <p:cNvPr id="412" name="Line"/>
+          <p:cNvPr id="413" name="Line"/>
           <p:cNvSpPr/>
           <p:nvPr/>
         </p:nvSpPr>
@@ -4819,7 +4819,7 @@
       </p:sp>
       <p:sp>
         <p:nvSpPr>
-          <p:cNvPr id="413" name="Line"/>
+          <p:cNvPr id="414" name="Line"/>
           <p:cNvSpPr/>
           <p:nvPr/>
         </p:nvSpPr>
@@ -4848,7 +4848,7 @@
       </p:sp>
       <p:sp>
         <p:nvSpPr>
-          <p:cNvPr id="414" name="Network Interface"/>
+          <p:cNvPr id="415" name="Network Interface"/>
           <p:cNvSpPr txBox="1"/>
           <p:nvPr/>
         </p:nvSpPr>
@@ -4899,7 +4899,7 @@
       </p:sp>
       <p:grpSp>
         <p:nvGrpSpPr>
-          <p:cNvPr id="417" name="Network Emulator"/>
+          <p:cNvPr id="418" name="Network Emulator"/>
           <p:cNvGrpSpPr/>
           <p:nvPr/>
         </p:nvGrpSpPr>
@@ -4913,7 +4913,7 @@
         </p:grpSpPr>
         <p:sp>
           <p:nvSpPr>
-            <p:cNvPr id="415" name="Rectangle"/>
+            <p:cNvPr id="416" name="Rectangle"/>
             <p:cNvSpPr/>
             <p:nvPr/>
           </p:nvSpPr>
@@ -4961,7 +4961,7 @@
         </p:sp>
         <p:sp>
           <p:nvSpPr>
-            <p:cNvPr id="416" name="Network Emulator"/>
+            <p:cNvPr id="417" name="Network Emulator"/>
             <p:cNvSpPr txBox="1"/>
             <p:nvPr/>
           </p:nvSpPr>
@@ -5009,7 +5009,7 @@
       </p:grpSp>
       <p:sp>
         <p:nvSpPr>
-          <p:cNvPr id="418" name="Date Placeholder 3"/>
+          <p:cNvPr id="419" name="Date Placeholder 3"/>
           <p:cNvSpPr txBox="1"/>
           <p:nvPr/>
         </p:nvSpPr>
@@ -5053,7 +5053,7 @@
       </p:sp>
       <p:sp>
         <p:nvSpPr>
-          <p:cNvPr id="419" name="Define Connection Characteristics…"/>
+          <p:cNvPr id="420" name="Define Connection Characteristics…"/>
           <p:cNvSpPr txBox="1"/>
           <p:nvPr>
             <p:ph type="body" idx="1"/>
@@ -5181,7 +5181,7 @@
       </p:grpSpPr>
       <p:pic>
         <p:nvPicPr>
-          <p:cNvPr id="421" name="sequenzediagram.jp2" descr="sequenzediagram.jp2"/>
+          <p:cNvPr id="422" name="sequenzediagram.jp2" descr="sequenzediagram.jp2"/>
           <p:cNvPicPr>
             <a:picLocks noChangeAspect="1"/>
           </p:cNvPicPr>
@@ -5210,7 +5210,7 @@
       </p:pic>
       <p:sp>
         <p:nvSpPr>
-          <p:cNvPr id="422" name="Date Placeholder 3"/>
+          <p:cNvPr id="423" name="Date Placeholder 3"/>
           <p:cNvSpPr txBox="1"/>
           <p:nvPr/>
         </p:nvSpPr>
@@ -5254,7 +5254,7 @@
       </p:sp>
       <p:sp>
         <p:nvSpPr>
-          <p:cNvPr id="423" name="Slide Number"/>
+          <p:cNvPr id="424" name="Slide Number"/>
           <p:cNvSpPr txBox="1"/>
           <p:nvPr>
             <p:ph type="sldNum" sz="quarter" idx="4294967295"/>
@@ -5281,7 +5281,7 @@
       </p:sp>
       <p:sp>
         <p:nvSpPr>
-          <p:cNvPr id="424" name="Footer Placeholder 4"/>
+          <p:cNvPr id="425" name="Footer Placeholder 4"/>
           <p:cNvSpPr txBox="1"/>
           <p:nvPr/>
         </p:nvSpPr>
@@ -5323,7 +5323,7 @@
       </p:sp>
       <p:sp>
         <p:nvSpPr>
-          <p:cNvPr id="425" name="Initial Notification by lectureStudio Server…"/>
+          <p:cNvPr id="426" name="Initial Notification by LectureStudio Server…"/>
           <p:cNvSpPr txBox="1"/>
           <p:nvPr>
             <p:ph type="body" idx="1"/>
@@ -5348,7 +5348,7 @@
               <a:buChar char="•"/>
             </a:pPr>
             <a:r>
-              <a:t>Initial Notification by lectureStudio Server</a:t>
+              <a:t>Initial Notification by LectureStudio Server</a:t>
             </a:r>
           </a:p>
           <a:p>
@@ -5425,7 +5425,7 @@
       </p:sp>
       <p:sp>
         <p:nvSpPr>
-          <p:cNvPr id="426" name="Communication and Data Transfer Processes"/>
+          <p:cNvPr id="427" name="Communication and Data Transfer Processes"/>
           <p:cNvSpPr txBox="1"/>
           <p:nvPr>
             <p:ph type="title"/>
@@ -5453,7 +5453,7 @@
       </p:sp>
       <p:sp>
         <p:nvSpPr>
-          <p:cNvPr id="427" name="Configuration of Containerlab File"/>
+          <p:cNvPr id="428" name="Configuration of Containerlab File"/>
           <p:cNvSpPr txBox="1"/>
           <p:nvPr/>
         </p:nvSpPr>
@@ -5530,7 +5530,7 @@
       </p:grpSpPr>
       <p:sp>
         <p:nvSpPr>
-          <p:cNvPr id="429" name="Connection and Data Distribution Among Peers"/>
+          <p:cNvPr id="430" name="Connection and Data Distribution Among Peers"/>
           <p:cNvSpPr txBox="1"/>
           <p:nvPr>
             <p:ph type="title"/>
@@ -5562,7 +5562,7 @@
       </p:sp>
       <p:sp>
         <p:nvSpPr>
-          <p:cNvPr id="430" name="Slide Number"/>
+          <p:cNvPr id="431" name="Slide Number"/>
           <p:cNvSpPr txBox="1"/>
           <p:nvPr>
             <p:ph type="sldNum" sz="quarter" idx="4294967295"/>
@@ -5593,7 +5593,7 @@
       </p:sp>
       <p:sp>
         <p:nvSpPr>
-          <p:cNvPr id="431" name="Footer Placeholder 4"/>
+          <p:cNvPr id="432" name="Footer Placeholder 4"/>
           <p:cNvSpPr txBox="1"/>
           <p:nvPr/>
         </p:nvSpPr>
@@ -5635,7 +5635,7 @@
       </p:sp>
       <p:sp>
         <p:nvSpPr>
-          <p:cNvPr id="432" name="Date Placeholder 3"/>
+          <p:cNvPr id="433" name="Date Placeholder 3"/>
           <p:cNvSpPr txBox="1"/>
           <p:nvPr/>
         </p:nvSpPr>
@@ -5679,7 +5679,7 @@
       </p:sp>
       <p:sp>
         <p:nvSpPr>
-          <p:cNvPr id="433" name="Rounded Rectangle"/>
+          <p:cNvPr id="434" name="Rounded Rectangle"/>
           <p:cNvSpPr/>
           <p:nvPr/>
         </p:nvSpPr>
@@ -5712,7 +5712,7 @@
       </p:sp>
       <p:sp>
         <p:nvSpPr>
-          <p:cNvPr id="434" name="Oval"/>
+          <p:cNvPr id="435" name="Oval"/>
           <p:cNvSpPr/>
           <p:nvPr/>
         </p:nvSpPr>
@@ -5743,7 +5743,7 @@
       </p:sp>
       <p:sp>
         <p:nvSpPr>
-          <p:cNvPr id="435" name="lectureStudio-Server"/>
+          <p:cNvPr id="436" name="lectureStudio-Server"/>
           <p:cNvSpPr txBox="1"/>
           <p:nvPr/>
         </p:nvSpPr>
@@ -5793,7 +5793,7 @@
       </p:sp>
       <p:sp>
         <p:nvSpPr>
-          <p:cNvPr id="436" name="Port:9090…"/>
+          <p:cNvPr id="437" name="Port:9090…"/>
           <p:cNvSpPr txBox="1"/>
           <p:nvPr/>
         </p:nvSpPr>
@@ -5859,7 +5859,7 @@
       </p:sp>
       <p:sp>
         <p:nvSpPr>
-          <p:cNvPr id="437" name="IP:172.20.25.4"/>
+          <p:cNvPr id="438" name="IP:172.20.25.4"/>
           <p:cNvSpPr txBox="1"/>
           <p:nvPr/>
         </p:nvSpPr>
@@ -5903,7 +5903,7 @@
       </p:sp>
       <p:sp>
         <p:nvSpPr>
-          <p:cNvPr id="438" name="eth1"/>
+          <p:cNvPr id="439" name="eth1"/>
           <p:cNvSpPr/>
           <p:nvPr/>
         </p:nvSpPr>
@@ -5950,7 +5950,7 @@
       </p:sp>
       <p:sp>
         <p:nvSpPr>
-          <p:cNvPr id="439" name="Rectangle"/>
+          <p:cNvPr id="440" name="Rectangle"/>
           <p:cNvSpPr/>
           <p:nvPr/>
         </p:nvSpPr>
@@ -5987,7 +5987,7 @@
       </p:sp>
       <p:sp>
         <p:nvSpPr>
-          <p:cNvPr id="440" name="Port:8080…"/>
+          <p:cNvPr id="441" name="Port:8080…"/>
           <p:cNvSpPr txBox="1"/>
           <p:nvPr/>
         </p:nvSpPr>
@@ -6051,7 +6051,7 @@
       </p:sp>
       <p:sp>
         <p:nvSpPr>
-          <p:cNvPr id="441" name="eth2"/>
+          <p:cNvPr id="442" name="eth2"/>
           <p:cNvSpPr/>
           <p:nvPr/>
         </p:nvSpPr>
@@ -6098,7 +6098,7 @@
       </p:sp>
       <p:sp>
         <p:nvSpPr>
-          <p:cNvPr id="442" name="eth1"/>
+          <p:cNvPr id="443" name="eth1"/>
           <p:cNvSpPr/>
           <p:nvPr/>
         </p:nvSpPr>
@@ -6145,7 +6145,7 @@
       </p:sp>
       <p:sp>
         <p:nvSpPr>
-          <p:cNvPr id="443" name="eth1"/>
+          <p:cNvPr id="444" name="eth1"/>
           <p:cNvSpPr/>
           <p:nvPr/>
         </p:nvSpPr>
@@ -6192,7 +6192,7 @@
       </p:sp>
       <p:sp>
         <p:nvSpPr>
-          <p:cNvPr id="444" name="eth2"/>
+          <p:cNvPr id="445" name="eth2"/>
           <p:cNvSpPr/>
           <p:nvPr/>
         </p:nvSpPr>
@@ -6239,7 +6239,7 @@
       </p:sp>
       <p:sp>
         <p:nvSpPr>
-          <p:cNvPr id="445" name="eth3"/>
+          <p:cNvPr id="446" name="eth3"/>
           <p:cNvSpPr/>
           <p:nvPr/>
         </p:nvSpPr>
@@ -6286,7 +6286,7 @@
       </p:sp>
       <p:sp>
         <p:nvSpPr>
-          <p:cNvPr id="446" name="Oval"/>
+          <p:cNvPr id="447" name="Oval"/>
           <p:cNvSpPr/>
           <p:nvPr/>
         </p:nvSpPr>
@@ -6317,7 +6317,7 @@
       </p:sp>
       <p:sp>
         <p:nvSpPr>
-          <p:cNvPr id="447" name="IP:172.20.25.4"/>
+          <p:cNvPr id="448" name="IP:172.20.25.4"/>
           <p:cNvSpPr txBox="1"/>
           <p:nvPr/>
         </p:nvSpPr>
@@ -6361,7 +6361,7 @@
       </p:sp>
       <p:sp>
         <p:nvSpPr>
-          <p:cNvPr id="448" name="Oval"/>
+          <p:cNvPr id="449" name="Oval"/>
           <p:cNvSpPr/>
           <p:nvPr/>
         </p:nvSpPr>
@@ -6392,7 +6392,7 @@
       </p:sp>
       <p:sp>
         <p:nvSpPr>
-          <p:cNvPr id="449" name="IP:172.20.25.4"/>
+          <p:cNvPr id="450" name="IP:172.20.25.4"/>
           <p:cNvSpPr txBox="1"/>
           <p:nvPr/>
         </p:nvSpPr>
@@ -6436,7 +6436,7 @@
       </p:sp>
       <p:sp>
         <p:nvSpPr>
-          <p:cNvPr id="450" name="eth1"/>
+          <p:cNvPr id="451" name="eth1"/>
           <p:cNvSpPr/>
           <p:nvPr/>
         </p:nvSpPr>
@@ -6483,7 +6483,7 @@
       </p:sp>
       <p:sp>
         <p:nvSpPr>
-          <p:cNvPr id="451" name="eth1"/>
+          <p:cNvPr id="452" name="eth1"/>
           <p:cNvSpPr/>
           <p:nvPr/>
         </p:nvSpPr>
@@ -6530,10 +6530,10 @@
       </p:sp>
       <p:cxnSp>
         <p:nvCxnSpPr>
-          <p:cNvPr id="452" name="Connection Line"/>
+          <p:cNvPr id="453" name="Connection Line"/>
           <p:cNvCxnSpPr>
-            <a:stCxn id="443" idx="0"/>
-            <a:endCxn id="438" idx="0"/>
+            <a:stCxn id="444" idx="0"/>
+            <a:endCxn id="439" idx="0"/>
           </p:cNvCxnSpPr>
           <p:nvPr/>
         </p:nvCxnSpPr>
@@ -6541,30 +6541,6 @@
           <a:xfrm flipV="1">
             <a:off x="7858299" y="2658558"/>
             <a:ext cx="365761" cy="677838"/>
-          </a:xfrm>
-          <a:prstGeom prst="straightConnector1">
-            <a:avLst/>
-          </a:prstGeom>
-          <a:ln w="12700">
-            <a:solidFill>
-              <a:schemeClr val="accent1"/>
-            </a:solidFill>
-          </a:ln>
-        </p:spPr>
-      </p:cxnSp>
-      <p:cxnSp>
-        <p:nvCxnSpPr>
-          <p:cNvPr id="453" name="Connection Line"/>
-          <p:cNvCxnSpPr>
-            <a:stCxn id="444" idx="0"/>
-            <a:endCxn id="450" idx="0"/>
-          </p:cNvCxnSpPr>
-          <p:nvPr/>
-        </p:nvCxnSpPr>
-        <p:spPr>
-          <a:xfrm flipH="1">
-            <a:off x="6484877" y="3759413"/>
-            <a:ext cx="413303" cy="649187"/>
           </a:xfrm>
           <a:prstGeom prst="straightConnector1">
             <a:avLst/>
@@ -6586,9 +6562,9 @@
           <p:nvPr/>
         </p:nvCxnSpPr>
         <p:spPr>
-          <a:xfrm>
-            <a:off x="7589059" y="3759413"/>
-            <a:ext cx="347277" cy="649187"/>
+          <a:xfrm flipH="1">
+            <a:off x="6484877" y="3759413"/>
+            <a:ext cx="413303" cy="649187"/>
           </a:xfrm>
           <a:prstGeom prst="straightConnector1">
             <a:avLst/>
@@ -6604,15 +6580,15 @@
         <p:nvCxnSpPr>
           <p:cNvPr id="455" name="Connection Line"/>
           <p:cNvCxnSpPr>
-            <a:stCxn id="441" idx="0"/>
-            <a:endCxn id="442" idx="0"/>
+            <a:stCxn id="446" idx="0"/>
+            <a:endCxn id="452" idx="0"/>
           </p:cNvCxnSpPr>
           <p:nvPr/>
         </p:nvCxnSpPr>
         <p:spPr>
           <a:xfrm>
-            <a:off x="9539779" y="2606321"/>
-            <a:ext cx="383541" cy="730075"/>
+            <a:off x="7589059" y="3759413"/>
+            <a:ext cx="347277" cy="649187"/>
           </a:xfrm>
           <a:prstGeom prst="straightConnector1">
             <a:avLst/>
@@ -6624,9 +6600,33 @@
           </a:ln>
         </p:spPr>
       </p:cxnSp>
-      <p:sp>
-        <p:nvSpPr>
-          <p:cNvPr id="456" name="lectureStudio-Server"/>
+      <p:cxnSp>
+        <p:nvCxnSpPr>
+          <p:cNvPr id="456" name="Connection Line"/>
+          <p:cNvCxnSpPr>
+            <a:stCxn id="442" idx="0"/>
+            <a:endCxn id="443" idx="0"/>
+          </p:cNvCxnSpPr>
+          <p:nvPr/>
+        </p:nvCxnSpPr>
+        <p:spPr>
+          <a:xfrm>
+            <a:off x="9539779" y="2606321"/>
+            <a:ext cx="383541" cy="730075"/>
+          </a:xfrm>
+          <a:prstGeom prst="straightConnector1">
+            <a:avLst/>
+          </a:prstGeom>
+          <a:ln w="12700">
+            <a:solidFill>
+              <a:schemeClr val="accent1"/>
+            </a:solidFill>
+          </a:ln>
+        </p:spPr>
+      </p:cxnSp>
+      <p:sp>
+        <p:nvSpPr>
+          <p:cNvPr id="457" name="lectureStudio-Server"/>
           <p:cNvSpPr txBox="1"/>
           <p:nvPr/>
         </p:nvSpPr>
@@ -6676,7 +6676,7 @@
       </p:sp>
       <p:sp>
         <p:nvSpPr>
-          <p:cNvPr id="457" name="lectureStudio-Server"/>
+          <p:cNvPr id="458" name="lectureStudio-Server"/>
           <p:cNvSpPr txBox="1"/>
           <p:nvPr/>
         </p:nvSpPr>
@@ -6726,7 +6726,7 @@
       </p:sp>
       <p:sp>
         <p:nvSpPr>
-          <p:cNvPr id="458" name="lectureStudio-Server"/>
+          <p:cNvPr id="459" name="lectureStudio-Server"/>
           <p:cNvSpPr txBox="1"/>
           <p:nvPr/>
         </p:nvSpPr>
@@ -6776,7 +6776,7 @@
       </p:sp>
       <p:sp>
         <p:nvSpPr>
-          <p:cNvPr id="459" name="lectureStudio-Server"/>
+          <p:cNvPr id="460" name="lectureStudio-Server"/>
           <p:cNvSpPr txBox="1"/>
           <p:nvPr/>
         </p:nvSpPr>
@@ -6826,13 +6826,13 @@
       </p:sp>
       <p:sp>
         <p:nvSpPr>
-          <p:cNvPr id="460" name="Configuration of Containerlab File"/>
+          <p:cNvPr id="461" name="Configuration of Containerlab File"/>
           <p:cNvSpPr txBox="1"/>
           <p:nvPr/>
         </p:nvSpPr>
         <p:spPr>
           <a:xfrm>
-            <a:off x="7217078" y="1596828"/>
+            <a:off x="7217078" y="1711128"/>
             <a:ext cx="3337681" cy="320039"/>
           </a:xfrm>
           <a:prstGeom prst="rect">
@@ -6877,7 +6877,7 @@
       </p:sp>
       <p:sp>
         <p:nvSpPr>
-          <p:cNvPr id="461" name="Add Node Info in Testbed Setup…"/>
+          <p:cNvPr id="462" name="Add Node Info in Testbed Setup…"/>
           <p:cNvSpPr txBox="1"/>
           <p:nvPr>
             <p:ph type="body" idx="1"/>
@@ -7025,7 +7025,7 @@
       </p:grpSpPr>
       <p:sp>
         <p:nvSpPr>
-          <p:cNvPr id="463" name="Connection and Data Distribution Among Peers"/>
+          <p:cNvPr id="464" name="Connection and Data Distribution Among Peers"/>
           <p:cNvSpPr txBox="1"/>
           <p:nvPr>
             <p:ph type="title"/>
@@ -7057,7 +7057,7 @@
       </p:sp>
       <p:sp>
         <p:nvSpPr>
-          <p:cNvPr id="464" name="Slide Number"/>
+          <p:cNvPr id="465" name="Slide Number"/>
           <p:cNvSpPr txBox="1"/>
           <p:nvPr>
             <p:ph type="sldNum" sz="quarter" idx="4294967295"/>
@@ -7088,7 +7088,7 @@
       </p:sp>
       <p:sp>
         <p:nvSpPr>
-          <p:cNvPr id="465" name="Footer Placeholder 4"/>
+          <p:cNvPr id="466" name="Footer Placeholder 4"/>
           <p:cNvSpPr txBox="1"/>
           <p:nvPr/>
         </p:nvSpPr>
@@ -7130,7 +7130,7 @@
       </p:sp>
       <p:sp>
         <p:nvSpPr>
-          <p:cNvPr id="466" name="Date Placeholder 3"/>
+          <p:cNvPr id="467" name="Date Placeholder 3"/>
           <p:cNvSpPr txBox="1"/>
           <p:nvPr/>
         </p:nvSpPr>
@@ -7174,7 +7174,7 @@
       </p:sp>
       <p:sp>
         <p:nvSpPr>
-          <p:cNvPr id="467" name="Add Node Info in Testbed Setup…"/>
+          <p:cNvPr id="468" name="Add Node Info in Testbed Setup…"/>
           <p:cNvSpPr txBox="1"/>
           <p:nvPr>
             <p:ph type="body" idx="1"/>
@@ -7376,7 +7376,7 @@
       </p:grpSpPr>
       <p:sp>
         <p:nvSpPr>
-          <p:cNvPr id="469" name="Footer Placeholder 4"/>
+          <p:cNvPr id="470" name="Footer Placeholder 4"/>
           <p:cNvSpPr txBox="1"/>
           <p:nvPr/>
         </p:nvSpPr>
@@ -7422,7 +7422,7 @@
       </p:sp>
       <p:sp>
         <p:nvSpPr>
-          <p:cNvPr id="470" name="Title 1"/>
+          <p:cNvPr id="471" name="Title 1"/>
           <p:cNvSpPr txBox="1"/>
           <p:nvPr>
             <p:ph type="title"/>
@@ -7454,7 +7454,7 @@
       </p:sp>
       <p:sp>
         <p:nvSpPr>
-          <p:cNvPr id="471" name="Content Placeholder 2"/>
+          <p:cNvPr id="472" name="Content Placeholder 2"/>
           <p:cNvSpPr txBox="1"/>
           <p:nvPr>
             <p:ph type="body" idx="1"/>
@@ -7473,22 +7473,22 @@
           <a:bodyPr/>
           <a:lstStyle/>
           <a:p>
-            <a:pPr marL="81381" indent="-81381" algn="ctr" defTabSz="813816">
+            <a:pPr marL="77311" indent="-77311" algn="ctr" defTabSz="773125">
               <a:spcBef>
-                <a:spcPts val="1000"/>
+                <a:spcPts val="900"/>
               </a:spcBef>
-              <a:defRPr b="1" sz="1700"/>
+              <a:defRPr b="1" sz="1615"/>
             </a:pPr>
             <a:r>
               <a:t>Testbed</a:t>
             </a:r>
           </a:p>
           <a:p>
-            <a:pPr marL="81381" indent="-81381" defTabSz="813816">
+            <a:pPr marL="77311" indent="-77311" defTabSz="773125">
               <a:spcBef>
-                <a:spcPts val="1000"/>
+                <a:spcPts val="900"/>
               </a:spcBef>
-              <a:defRPr sz="1700"/>
+              <a:defRPr sz="1615"/>
             </a:pPr>
             <a:r>
               <a:rPr b="1"/>
@@ -7500,11 +7500,11 @@
             <a:br/>
           </a:p>
           <a:p>
-            <a:pPr marL="81381" indent="-81381" defTabSz="813816">
+            <a:pPr marL="77311" indent="-77311" defTabSz="773125">
               <a:spcBef>
-                <a:spcPts val="1000"/>
+                <a:spcPts val="900"/>
               </a:spcBef>
-              <a:defRPr sz="1700"/>
+              <a:defRPr sz="1615"/>
             </a:pPr>
             <a:r>
               <a:rPr b="1"/>
@@ -7515,46 +7515,46 @@
             </a:r>
           </a:p>
           <a:p>
-            <a:pPr marL="81381" indent="-81381" defTabSz="813816">
+            <a:pPr marL="77311" indent="-77311" defTabSz="773125">
               <a:spcBef>
-                <a:spcPts val="1000"/>
+                <a:spcPts val="900"/>
               </a:spcBef>
-              <a:defRPr sz="1700"/>
-            </a:pPr>
-          </a:p>
-          <a:p>
-            <a:pPr marL="81381" indent="-81381" algn="ctr" defTabSz="813816">
+              <a:defRPr sz="1615"/>
+            </a:pPr>
+          </a:p>
+          <a:p>
+            <a:pPr marL="77311" indent="-77311" algn="ctr" defTabSz="773125">
               <a:spcBef>
-                <a:spcPts val="1000"/>
+                <a:spcPts val="900"/>
               </a:spcBef>
-              <a:defRPr b="1" sz="1700"/>
+              <a:defRPr b="1" sz="1615"/>
             </a:pPr>
             <a:r>
               <a:t>P2P Algorithm</a:t>
             </a:r>
           </a:p>
           <a:p>
-            <a:pPr marL="81381" indent="-81381" defTabSz="813816">
+            <a:pPr marL="77311" indent="-77311" defTabSz="773125">
               <a:spcBef>
-                <a:spcPts val="1000"/>
+                <a:spcPts val="900"/>
               </a:spcBef>
-              <a:defRPr sz="1700"/>
+              <a:defRPr sz="1615"/>
             </a:pPr>
             <a:r>
               <a:rPr b="1"/>
               <a:t>RQ2.1</a:t>
             </a:r>
             <a:r>
-              <a:t> How Do CPU and Memory Usage Change of the Participants in Tests with and without the P2P Algorithm? </a:t>
+              <a:t> How Do CPU and Memory Usage Change of the Participants (LectureStudio Server and Peers) in Tests with and without the P2P Algorithm? </a:t>
             </a:r>
             <a:br/>
           </a:p>
           <a:p>
-            <a:pPr marL="81381" indent="-81381" defTabSz="813816">
+            <a:pPr marL="77311" indent="-77311" defTabSz="773125">
               <a:spcBef>
-                <a:spcPts val="1000"/>
+                <a:spcPts val="900"/>
               </a:spcBef>
-              <a:defRPr sz="1700"/>
+              <a:defRPr sz="1615"/>
             </a:pPr>
             <a:r>
               <a:rPr b="1"/>
@@ -7566,11 +7566,11 @@
             <a:br/>
           </a:p>
           <a:p>
-            <a:pPr marL="81381" indent="-81381" defTabSz="813816">
+            <a:pPr marL="77311" indent="-77311" defTabSz="773125">
               <a:spcBef>
-                <a:spcPts val="1000"/>
+                <a:spcPts val="900"/>
               </a:spcBef>
-              <a:defRPr b="1" sz="1700"/>
+              <a:defRPr b="1" sz="1615"/>
             </a:pPr>
             <a:r>
               <a:t>RQ2.3 </a:t>
@@ -7585,7 +7585,7 @@
       </p:sp>
       <p:sp>
         <p:nvSpPr>
-          <p:cNvPr id="472" name="Slide Number Placeholder 5"/>
+          <p:cNvPr id="473" name="Slide Number Placeholder 5"/>
           <p:cNvSpPr txBox="1"/>
           <p:nvPr>
             <p:ph type="sldNum" sz="quarter" idx="4294967295"/>
@@ -7616,7 +7616,7 @@
       </p:sp>
       <p:sp>
         <p:nvSpPr>
-          <p:cNvPr id="473" name="Date Placeholder 3"/>
+          <p:cNvPr id="474" name="Date Placeholder 3"/>
           <p:cNvSpPr txBox="1"/>
           <p:nvPr/>
         </p:nvSpPr>
@@ -7686,7 +7686,7 @@
       </p:grpSpPr>
       <p:sp>
         <p:nvSpPr>
-          <p:cNvPr id="475" name="Footer Placeholder 4"/>
+          <p:cNvPr id="476" name="Footer Placeholder 4"/>
           <p:cNvSpPr txBox="1"/>
           <p:nvPr/>
         </p:nvSpPr>
@@ -7732,7 +7732,7 @@
       </p:sp>
       <p:sp>
         <p:nvSpPr>
-          <p:cNvPr id="476" name="Title 1"/>
+          <p:cNvPr id="477" name="Title 1"/>
           <p:cNvSpPr txBox="1"/>
           <p:nvPr>
             <p:ph type="title"/>
@@ -7764,7 +7764,7 @@
       </p:sp>
       <p:sp>
         <p:nvSpPr>
-          <p:cNvPr id="477" name="Slide Number Placeholder 5"/>
+          <p:cNvPr id="478" name="Slide Number Placeholder 5"/>
           <p:cNvSpPr txBox="1"/>
           <p:nvPr>
             <p:ph type="sldNum" sz="quarter" idx="4294967295"/>
@@ -7795,7 +7795,7 @@
       </p:sp>
       <p:sp>
         <p:nvSpPr>
-          <p:cNvPr id="478" name="Date Placeholder 3"/>
+          <p:cNvPr id="479" name="Date Placeholder 3"/>
           <p:cNvSpPr txBox="1"/>
           <p:nvPr/>
         </p:nvSpPr>
@@ -7839,7 +7839,7 @@
       </p:sp>
       <p:pic>
         <p:nvPicPr>
-          <p:cNvPr id="479" name="latency_error_rate_withP2P.png" descr="latency_error_rate_withP2P.png"/>
+          <p:cNvPr id="480" name="latency_error_rate_withP2P.png" descr="latency_error_rate_withP2P.png"/>
           <p:cNvPicPr>
             <a:picLocks noChangeAspect="1"/>
           </p:cNvPicPr>
@@ -7868,7 +7868,7 @@
       </p:pic>
       <p:sp>
         <p:nvSpPr>
-          <p:cNvPr id="480" name="Configuration of Containerlab File"/>
+          <p:cNvPr id="481" name="Configuration of Containerlab File"/>
           <p:cNvSpPr txBox="1"/>
           <p:nvPr/>
         </p:nvSpPr>
@@ -7915,14 +7915,14 @@
           <a:p>
             <a:pPr/>
             <a:r>
-              <a:t>Error Rate for Latency with P2P Algorithm</a:t>
-            </a:r>
-          </a:p>
-        </p:txBody>
-      </p:sp>
-      <p:sp>
-        <p:nvSpPr>
-          <p:cNvPr id="481" name="Configuration of Containerlab File"/>
+              <a:t>Error Rate for Latency with the P2P Algorithm</a:t>
+            </a:r>
+          </a:p>
+        </p:txBody>
+      </p:sp>
+      <p:sp>
+        <p:nvSpPr>
+          <p:cNvPr id="482" name="Configuration of Containerlab File"/>
           <p:cNvSpPr txBox="1"/>
           <p:nvPr/>
         </p:nvSpPr>
@@ -7969,14 +7969,14 @@
           <a:p>
             <a:pPr/>
             <a:r>
-              <a:t>Error Rate for Latency without P2P Algorithm</a:t>
+              <a:t>Error Rate for Latency without the P2P Algorithm</a:t>
             </a:r>
           </a:p>
         </p:txBody>
       </p:sp>
       <p:pic>
         <p:nvPicPr>
-          <p:cNvPr id="482" name="latency_error_rate_withoutP2P.png" descr="latency_error_rate_withoutP2P.png"/>
+          <p:cNvPr id="483" name="latency_error_rate_withoutP2P.png" descr="latency_error_rate_withoutP2P.png"/>
           <p:cNvPicPr>
             <a:picLocks noChangeAspect="1"/>
           </p:cNvPicPr>
@@ -8005,16 +8005,16 @@
       </p:pic>
       <p:sp>
         <p:nvSpPr>
-          <p:cNvPr id="483" name="Content Placeholder 2"/>
+          <p:cNvPr id="484" name="Content Placeholder 2"/>
           <p:cNvSpPr txBox="1"/>
           <p:nvPr>
-            <p:ph type="body" idx="1"/>
+            <p:ph type="body" sz="half" idx="1"/>
           </p:nvPr>
         </p:nvSpPr>
         <p:spPr>
           <a:xfrm>
-            <a:off x="1097280" y="1358900"/>
-            <a:ext cx="10058401" cy="4515080"/>
+            <a:off x="1097280" y="1358899"/>
+            <a:ext cx="10058401" cy="1688268"/>
           </a:xfrm>
           <a:prstGeom prst="rect">
             <a:avLst/>
@@ -8050,7 +8050,7 @@
               <a:buChar char="•"/>
             </a:pPr>
             <a:r>
-              <a:t>A Reduction in Bandwidth Corresponds to a Rise in Latency.</a:t>
+              <a:t>A Reduction in Bandwidth Corresponds to a Rise in Latency</a:t>
             </a:r>
           </a:p>
           <a:p>
@@ -8060,7 +8060,7 @@
               <a:buChar char="•"/>
             </a:pPr>
             <a:r>
-              <a:t>High CPU and memory usage impacting network performance and Latency</a:t>
+              <a:t>High CPU and Memory Usage Impacting Network Performance and Latency</a:t>
             </a:r>
           </a:p>
         </p:txBody>
@@ -8093,7 +8093,7 @@
       </p:grpSpPr>
       <p:sp>
         <p:nvSpPr>
-          <p:cNvPr id="485" name="Footer Placeholder 4"/>
+          <p:cNvPr id="486" name="Footer Placeholder 4"/>
           <p:cNvSpPr txBox="1"/>
           <p:nvPr/>
         </p:nvSpPr>
@@ -8139,7 +8139,7 @@
       </p:sp>
       <p:sp>
         <p:nvSpPr>
-          <p:cNvPr id="486" name="Title 1"/>
+          <p:cNvPr id="487" name="Title 1"/>
           <p:cNvSpPr txBox="1"/>
           <p:nvPr>
             <p:ph type="title"/>
@@ -8171,7 +8171,7 @@
       </p:sp>
       <p:sp>
         <p:nvSpPr>
-          <p:cNvPr id="487" name="Slide Number Placeholder 5"/>
+          <p:cNvPr id="488" name="Slide Number Placeholder 5"/>
           <p:cNvSpPr txBox="1"/>
           <p:nvPr>
             <p:ph type="sldNum" sz="quarter" idx="4294967295"/>
@@ -8202,7 +8202,7 @@
       </p:sp>
       <p:sp>
         <p:nvSpPr>
-          <p:cNvPr id="488" name="Date Placeholder 3"/>
+          <p:cNvPr id="489" name="Date Placeholder 3"/>
           <p:cNvSpPr txBox="1"/>
           <p:nvPr/>
         </p:nvSpPr>
@@ -8246,7 +8246,7 @@
       </p:sp>
       <p:pic>
         <p:nvPicPr>
-          <p:cNvPr id="489" name="bandwidht_error_rate_withP2P.png" descr="bandwidht_error_rate_withP2P.png"/>
+          <p:cNvPr id="490" name="bandwidht_error_rate_withP2P.png" descr="bandwidht_error_rate_withP2P.png"/>
           <p:cNvPicPr>
             <a:picLocks noChangeAspect="1"/>
           </p:cNvPicPr>
@@ -8275,7 +8275,7 @@
       </p:pic>
       <p:pic>
         <p:nvPicPr>
-          <p:cNvPr id="490" name="bandwidth_error_rate_withoutP2P.png" descr="bandwidth_error_rate_withoutP2P.png"/>
+          <p:cNvPr id="491" name="bandwidth_error_rate_withoutP2P.png" descr="bandwidth_error_rate_withoutP2P.png"/>
           <p:cNvPicPr>
             <a:picLocks noChangeAspect="1"/>
           </p:cNvPicPr>
@@ -8304,7 +8304,7 @@
       </p:pic>
       <p:sp>
         <p:nvSpPr>
-          <p:cNvPr id="491" name="Configuration of Containerlab File"/>
+          <p:cNvPr id="492" name="Configuration of Containerlab File"/>
           <p:cNvSpPr txBox="1"/>
           <p:nvPr/>
         </p:nvSpPr>
@@ -8351,21 +8351,21 @@
           <a:p>
             <a:pPr/>
             <a:r>
-              <a:t>Error Rate for Bandwidth with P2P Algorithm</a:t>
-            </a:r>
-          </a:p>
-        </p:txBody>
-      </p:sp>
-      <p:sp>
-        <p:nvSpPr>
-          <p:cNvPr id="492" name="Configuration of Containerlab File"/>
+              <a:t>Error Rate for Bandwidth with the P2P Algorithm</a:t>
+            </a:r>
+          </a:p>
+        </p:txBody>
+      </p:sp>
+      <p:sp>
+        <p:nvSpPr>
+          <p:cNvPr id="493" name="Configuration of Containerlab File"/>
           <p:cNvSpPr txBox="1"/>
           <p:nvPr/>
         </p:nvSpPr>
         <p:spPr>
           <a:xfrm>
-            <a:off x="7011022" y="2913930"/>
-            <a:ext cx="3751876" cy="280798"/>
+            <a:off x="6931045" y="2913930"/>
+            <a:ext cx="3841607" cy="280798"/>
           </a:xfrm>
           <a:prstGeom prst="rect">
             <a:avLst/>
@@ -8405,23 +8405,23 @@
           <a:p>
             <a:pPr/>
             <a:r>
-              <a:t>Error Rate for Bandwidth without P2P Algorithm</a:t>
-            </a:r>
-          </a:p>
-        </p:txBody>
-      </p:sp>
-      <p:sp>
-        <p:nvSpPr>
-          <p:cNvPr id="493" name="Content Placeholder 2"/>
+              <a:t>Error Rate for Bandwidth without the P2P Algorithm</a:t>
+            </a:r>
+          </a:p>
+        </p:txBody>
+      </p:sp>
+      <p:sp>
+        <p:nvSpPr>
+          <p:cNvPr id="494" name="Content Placeholder 2"/>
           <p:cNvSpPr txBox="1"/>
           <p:nvPr>
-            <p:ph type="body" idx="1"/>
+            <p:ph type="body" sz="quarter" idx="1"/>
           </p:nvPr>
         </p:nvSpPr>
         <p:spPr>
           <a:xfrm>
-            <a:off x="1097280" y="1358900"/>
-            <a:ext cx="10058401" cy="4515080"/>
+            <a:off x="1097280" y="1358899"/>
+            <a:ext cx="10058401" cy="1402272"/>
           </a:xfrm>
           <a:prstGeom prst="rect">
             <a:avLst/>
@@ -8457,7 +8457,7 @@
               <a:buChar char="•"/>
             </a:pPr>
             <a:r>
-              <a:t>Variables Like Network Conditions, Configuration, System overhead</a:t>
+              <a:t>Variables Like Network Conditions, Configuration, System Overhead</a:t>
             </a:r>
           </a:p>
         </p:txBody>
@@ -8490,7 +8490,7 @@
       </p:grpSpPr>
       <p:sp>
         <p:nvSpPr>
-          <p:cNvPr id="495" name="Footer Placeholder 4"/>
+          <p:cNvPr id="496" name="Footer Placeholder 4"/>
           <p:cNvSpPr txBox="1"/>
           <p:nvPr/>
         </p:nvSpPr>
@@ -8536,7 +8536,7 @@
       </p:sp>
       <p:sp>
         <p:nvSpPr>
-          <p:cNvPr id="496" name="Title 1"/>
+          <p:cNvPr id="497" name="Title 1"/>
           <p:cNvSpPr txBox="1"/>
           <p:nvPr>
             <p:ph type="title"/>
@@ -8568,7 +8568,7 @@
       </p:sp>
       <p:sp>
         <p:nvSpPr>
-          <p:cNvPr id="497" name="Slide Number Placeholder 5"/>
+          <p:cNvPr id="498" name="Slide Number Placeholder 5"/>
           <p:cNvSpPr txBox="1"/>
           <p:nvPr>
             <p:ph type="sldNum" sz="quarter" idx="4294967295"/>
@@ -8599,7 +8599,7 @@
       </p:sp>
       <p:sp>
         <p:nvSpPr>
-          <p:cNvPr id="498" name="Date Placeholder 3"/>
+          <p:cNvPr id="499" name="Date Placeholder 3"/>
           <p:cNvSpPr txBox="1"/>
           <p:nvPr/>
         </p:nvSpPr>
@@ -8643,7 +8643,7 @@
       </p:sp>
       <p:pic>
         <p:nvPicPr>
-          <p:cNvPr id="499" name="duration_deploying_destroying_containerlab.png" descr="duration_deploying_destroying_containerlab.png"/>
+          <p:cNvPr id="500" name="duration_deploying_destroying_containerlab.png" descr="duration_deploying_destroying_containerlab.png"/>
           <p:cNvPicPr>
             <a:picLocks noChangeAspect="1"/>
           </p:cNvPicPr>
@@ -8672,7 +8672,7 @@
       </p:pic>
       <p:pic>
         <p:nvPicPr>
-          <p:cNvPr id="500" name="cpu_memory_usage_of_host.png" descr="cpu_memory_usage_of_host.png"/>
+          <p:cNvPr id="501" name="cpu_memory_usage_of_host.png" descr="cpu_memory_usage_of_host.png"/>
           <p:cNvPicPr>
             <a:picLocks noChangeAspect="1"/>
           </p:cNvPicPr>
@@ -8701,7 +8701,7 @@
       </p:pic>
       <p:sp>
         <p:nvSpPr>
-          <p:cNvPr id="501" name="Configuration of Containerlab File"/>
+          <p:cNvPr id="502" name="Configuration of Containerlab File"/>
           <p:cNvSpPr txBox="1"/>
           <p:nvPr/>
         </p:nvSpPr>
@@ -8755,7 +8755,7 @@
       </p:sp>
       <p:sp>
         <p:nvSpPr>
-          <p:cNvPr id="502" name="Configuration of Containerlab File"/>
+          <p:cNvPr id="503" name="Configuration of Containerlab File"/>
           <p:cNvSpPr txBox="1"/>
           <p:nvPr/>
         </p:nvSpPr>
@@ -8809,7 +8809,7 @@
       </p:sp>
       <p:sp>
         <p:nvSpPr>
-          <p:cNvPr id="503" name="Content Placeholder 2"/>
+          <p:cNvPr id="504" name="Content Placeholder 2"/>
           <p:cNvSpPr txBox="1"/>
           <p:nvPr>
             <p:ph type="body" sz="quarter" idx="1"/>
@@ -8873,7 +8873,7 @@
       </p:sp>
       <p:sp>
         <p:nvSpPr>
-          <p:cNvPr id="504" name="Content Placeholder 2"/>
+          <p:cNvPr id="505" name="Content Placeholder 2"/>
           <p:cNvSpPr txBox="1"/>
           <p:nvPr/>
         </p:nvSpPr>
@@ -8989,7 +8989,7 @@
       </p:grpSpPr>
       <p:sp>
         <p:nvSpPr>
-          <p:cNvPr id="506" name="Footer Placeholder 4"/>
+          <p:cNvPr id="507" name="Footer Placeholder 4"/>
           <p:cNvSpPr txBox="1"/>
           <p:nvPr/>
         </p:nvSpPr>
@@ -9035,7 +9035,7 @@
       </p:sp>
       <p:sp>
         <p:nvSpPr>
-          <p:cNvPr id="507" name="Title 1"/>
+          <p:cNvPr id="508" name="Title 1"/>
           <p:cNvSpPr txBox="1"/>
           <p:nvPr>
             <p:ph type="title"/>
@@ -9067,16 +9067,16 @@
       </p:sp>
       <p:sp>
         <p:nvSpPr>
-          <p:cNvPr id="508" name="Content Placeholder 2"/>
+          <p:cNvPr id="509" name="Content Placeholder 2"/>
           <p:cNvSpPr txBox="1"/>
           <p:nvPr>
-            <p:ph type="body" idx="1"/>
+            <p:ph type="body" sz="half" idx="1"/>
           </p:nvPr>
         </p:nvSpPr>
         <p:spPr>
           <a:xfrm>
             <a:off x="1097280" y="1354015"/>
-            <a:ext cx="10058401" cy="4515080"/>
+            <a:ext cx="10058401" cy="1837737"/>
           </a:xfrm>
           <a:prstGeom prst="rect">
             <a:avLst/>
@@ -9129,7 +9129,7 @@
       </p:sp>
       <p:sp>
         <p:nvSpPr>
-          <p:cNvPr id="509" name="Slide Number Placeholder 5"/>
+          <p:cNvPr id="510" name="Slide Number Placeholder 5"/>
           <p:cNvSpPr txBox="1"/>
           <p:nvPr>
             <p:ph type="sldNum" sz="quarter" idx="4294967295"/>
@@ -9160,7 +9160,7 @@
       </p:sp>
       <p:sp>
         <p:nvSpPr>
-          <p:cNvPr id="510" name="Date Placeholder 3"/>
+          <p:cNvPr id="511" name="Date Placeholder 3"/>
           <p:cNvSpPr txBox="1"/>
           <p:nvPr/>
         </p:nvSpPr>
@@ -9204,7 +9204,7 @@
       </p:sp>
       <p:pic>
         <p:nvPicPr>
-          <p:cNvPr id="511" name="cpu_usage_50peers_withoutP2P.png" descr="cpu_usage_50peers_withoutP2P.png"/>
+          <p:cNvPr id="512" name="cpu_usage_50peers_withoutP2P.png" descr="cpu_usage_50peers_withoutP2P.png"/>
           <p:cNvPicPr>
             <a:picLocks noChangeAspect="1"/>
           </p:cNvPicPr>
@@ -9220,7 +9220,7 @@
         </p:blipFill>
         <p:spPr>
           <a:xfrm>
-            <a:off x="6464300" y="3733800"/>
+            <a:off x="6464300" y="3860800"/>
             <a:ext cx="4837495" cy="2222500"/>
           </a:xfrm>
           <a:prstGeom prst="rect">
@@ -9233,7 +9233,7 @@
       </p:pic>
       <p:pic>
         <p:nvPicPr>
-          <p:cNvPr id="512" name="cpu_usage_50peers_withP2P.png" descr="cpu_usage_50peers_withP2P.png"/>
+          <p:cNvPr id="513" name="cpu_usage_50peers_withP2P.png" descr="cpu_usage_50peers_withP2P.png"/>
           <p:cNvPicPr>
             <a:picLocks noChangeAspect="1"/>
           </p:cNvPicPr>
@@ -9249,7 +9249,7 @@
         </p:blipFill>
         <p:spPr>
           <a:xfrm>
-            <a:off x="1181100" y="3733800"/>
+            <a:off x="1181100" y="3860800"/>
             <a:ext cx="4718023" cy="2222500"/>
           </a:xfrm>
           <a:prstGeom prst="rect">
@@ -9262,13 +9262,13 @@
       </p:pic>
       <p:sp>
         <p:nvSpPr>
-          <p:cNvPr id="513" name="Configuration of Containerlab File"/>
+          <p:cNvPr id="514" name="Configuration of Containerlab File"/>
           <p:cNvSpPr txBox="1"/>
           <p:nvPr/>
         </p:nvSpPr>
         <p:spPr>
           <a:xfrm>
-            <a:off x="1803400" y="3314700"/>
+            <a:off x="1803400" y="3441700"/>
             <a:ext cx="3751875" cy="280797"/>
           </a:xfrm>
           <a:prstGeom prst="rect">
@@ -9309,21 +9309,21 @@
           <a:p>
             <a:pPr/>
             <a:r>
-              <a:t>CPU Usage with P2P Algorithm</a:t>
-            </a:r>
-          </a:p>
-        </p:txBody>
-      </p:sp>
-      <p:sp>
-        <p:nvSpPr>
-          <p:cNvPr id="514" name="Configuration of Containerlab File"/>
+              <a:t>CPU Usage with the P2P Algorithm</a:t>
+            </a:r>
+          </a:p>
+        </p:txBody>
+      </p:sp>
+      <p:sp>
+        <p:nvSpPr>
+          <p:cNvPr id="515" name="Configuration of Containerlab File"/>
           <p:cNvSpPr txBox="1"/>
           <p:nvPr/>
         </p:nvSpPr>
         <p:spPr>
           <a:xfrm>
-            <a:off x="7010400" y="3314700"/>
-            <a:ext cx="3751875" cy="280797"/>
+            <a:off x="7188125" y="3441700"/>
+            <a:ext cx="3751876" cy="280797"/>
           </a:xfrm>
           <a:prstGeom prst="rect">
             <a:avLst/>
@@ -9363,7 +9363,7 @@
           <a:p>
             <a:pPr/>
             <a:r>
-              <a:t>CPU Usage without P2P Algorithm</a:t>
+              <a:t>CPU Usage without the P2P Algorithm</a:t>
             </a:r>
           </a:p>
         </p:txBody>
@@ -9396,7 +9396,7 @@
       </p:grpSpPr>
       <p:sp>
         <p:nvSpPr>
-          <p:cNvPr id="516" name="Footer Placeholder 4"/>
+          <p:cNvPr id="517" name="Footer Placeholder 4"/>
           <p:cNvSpPr txBox="1"/>
           <p:nvPr/>
         </p:nvSpPr>
@@ -9442,7 +9442,7 @@
       </p:sp>
       <p:sp>
         <p:nvSpPr>
-          <p:cNvPr id="517" name="Title 1"/>
+          <p:cNvPr id="518" name="Title 1"/>
           <p:cNvSpPr txBox="1"/>
           <p:nvPr>
             <p:ph type="title"/>
@@ -9474,7 +9474,7 @@
       </p:sp>
       <p:sp>
         <p:nvSpPr>
-          <p:cNvPr id="518" name="Slide Number Placeholder 5"/>
+          <p:cNvPr id="519" name="Slide Number Placeholder 5"/>
           <p:cNvSpPr txBox="1"/>
           <p:nvPr>
             <p:ph type="sldNum" sz="quarter" idx="4294967295"/>
@@ -9505,7 +9505,7 @@
       </p:sp>
       <p:sp>
         <p:nvSpPr>
-          <p:cNvPr id="519" name="Date Placeholder 3"/>
+          <p:cNvPr id="520" name="Date Placeholder 3"/>
           <p:cNvSpPr txBox="1"/>
           <p:nvPr/>
         </p:nvSpPr>
@@ -9549,7 +9549,7 @@
       </p:sp>
       <p:pic>
         <p:nvPicPr>
-          <p:cNvPr id="520" name="memory_usage_50peers_withoutP2P.png" descr="memory_usage_50peers_withoutP2P.png"/>
+          <p:cNvPr id="521" name="memory_usage_50peers_withoutP2P.png" descr="memory_usage_50peers_withoutP2P.png"/>
           <p:cNvPicPr>
             <a:picLocks noChangeAspect="1"/>
           </p:cNvPicPr>
@@ -9578,7 +9578,7 @@
       </p:pic>
       <p:pic>
         <p:nvPicPr>
-          <p:cNvPr id="521" name="memory_usage_50peers_withP2P.png" descr="memory_usage_50peers_withP2P.png"/>
+          <p:cNvPr id="522" name="memory_usage_50peers_withP2P.png" descr="memory_usage_50peers_withP2P.png"/>
           <p:cNvPicPr>
             <a:picLocks noChangeAspect="1"/>
           </p:cNvPicPr>
@@ -9607,7 +9607,7 @@
       </p:pic>
       <p:sp>
         <p:nvSpPr>
-          <p:cNvPr id="522" name="Configuration of Containerlab File"/>
+          <p:cNvPr id="523" name="Configuration of Containerlab File"/>
           <p:cNvSpPr txBox="1"/>
           <p:nvPr/>
         </p:nvSpPr>
@@ -9654,14 +9654,14 @@
           <a:p>
             <a:pPr/>
             <a:r>
-              <a:t>Memory Usage with P2P Algorithm</a:t>
-            </a:r>
-          </a:p>
-        </p:txBody>
-      </p:sp>
-      <p:sp>
-        <p:nvSpPr>
-          <p:cNvPr id="523" name="Configuration of Containerlab File"/>
+              <a:t>Memory Usage with the P2P Algorithm</a:t>
+            </a:r>
+          </a:p>
+        </p:txBody>
+      </p:sp>
+      <p:sp>
+        <p:nvSpPr>
+          <p:cNvPr id="524" name="Configuration of Containerlab File"/>
           <p:cNvSpPr txBox="1"/>
           <p:nvPr/>
         </p:nvSpPr>
@@ -9708,23 +9708,23 @@
           <a:p>
             <a:pPr/>
             <a:r>
-              <a:t>Memory Usage without P2P Algorithm</a:t>
-            </a:r>
-          </a:p>
-        </p:txBody>
-      </p:sp>
-      <p:sp>
-        <p:nvSpPr>
-          <p:cNvPr id="524" name="Content Placeholder 2"/>
+              <a:t>Memory Usage without the P2P Algorithm</a:t>
+            </a:r>
+          </a:p>
+        </p:txBody>
+      </p:sp>
+      <p:sp>
+        <p:nvSpPr>
+          <p:cNvPr id="525" name="Content Placeholder 2"/>
           <p:cNvSpPr txBox="1"/>
           <p:nvPr>
-            <p:ph type="body" sz="half" idx="1"/>
+            <p:ph type="body" sz="quarter" idx="1"/>
           </p:nvPr>
         </p:nvSpPr>
         <p:spPr>
           <a:xfrm>
             <a:off x="1097280" y="1354015"/>
-            <a:ext cx="10058401" cy="1837737"/>
+            <a:ext cx="10058401" cy="1478085"/>
           </a:xfrm>
           <a:prstGeom prst="rect">
             <a:avLst/>
@@ -10238,7 +10238,7 @@
               </a:defRPr>
             </a:pPr>
             <a:r>
-              <a:t>P2P Algorithm for lectureStudio</a:t>
+              <a:t>A P2P Algorithm for lectureStudio</a:t>
             </a:r>
           </a:p>
           <a:p>
@@ -10333,7 +10333,7 @@
               </a:defRPr>
             </a:pPr>
             <a:r>
-              <a:t>Developing A Container-Based Testbed Environment for P2P Algorithm</a:t>
+              <a:t>Developing A Container-Based Testbed Environment for the P2P Algorithm</a:t>
             </a:r>
           </a:p>
           <a:p>
@@ -11897,13 +11897,17 @@
       </p:grpSpPr>
       <p:sp>
         <p:nvSpPr>
-          <p:cNvPr id="526" name="Performance Evaluation of P2P Algorithm, RQ2.2 and RQ2.3 (1)"/>
+          <p:cNvPr id="527" name="Performance Evaluation of P2P Algorithm, RQ2.2 and RQ2.3 (1)"/>
           <p:cNvSpPr txBox="1"/>
           <p:nvPr>
             <p:ph type="title"/>
           </p:nvPr>
         </p:nvSpPr>
         <p:spPr>
+          <a:xfrm>
+            <a:off x="1097280" y="586237"/>
+            <a:ext cx="10058401" cy="619904"/>
+          </a:xfrm>
           <a:prstGeom prst="rect">
             <a:avLst/>
           </a:prstGeom>
@@ -11925,7 +11929,7 @@
       </p:sp>
       <p:sp>
         <p:nvSpPr>
-          <p:cNvPr id="527" name="Date Placeholder 3"/>
+          <p:cNvPr id="528" name="Date Placeholder 3"/>
           <p:cNvSpPr txBox="1"/>
           <p:nvPr/>
         </p:nvSpPr>
@@ -11969,7 +11973,7 @@
       </p:sp>
       <p:sp>
         <p:nvSpPr>
-          <p:cNvPr id="528" name="Footer Placeholder 4"/>
+          <p:cNvPr id="529" name="Footer Placeholder 4"/>
           <p:cNvSpPr txBox="1"/>
           <p:nvPr/>
         </p:nvSpPr>
@@ -12015,7 +12019,7 @@
       </p:sp>
       <p:sp>
         <p:nvSpPr>
-          <p:cNvPr id="529" name="Slide Number"/>
+          <p:cNvPr id="530" name="Slide Number"/>
           <p:cNvSpPr txBox="1"/>
           <p:nvPr>
             <p:ph type="sldNum" sz="quarter" idx="4294967295"/>
@@ -12042,7 +12046,7 @@
       </p:sp>
       <p:sp>
         <p:nvSpPr>
-          <p:cNvPr id="530" name="Test Duration Measured from First to Last Acknowledgment Message…"/>
+          <p:cNvPr id="531" name="Test Duration Measurement from First to Last Acknowledgment Message…"/>
           <p:cNvSpPr txBox="1"/>
           <p:nvPr>
             <p:ph type="body" idx="1"/>
@@ -12071,7 +12075,7 @@
               <a:defRPr sz="1779"/>
             </a:pPr>
             <a:r>
-              <a:t>Test Duration Measured from First to Last Acknowledgment Message</a:t>
+              <a:t>Test Duration Measurement from First to Last Acknowledgment Message</a:t>
             </a:r>
           </a:p>
           <a:p>
@@ -12099,7 +12103,7 @@
               <a:defRPr sz="1779"/>
             </a:pPr>
             <a:r>
-              <a:t>Varying Data Size or Number of Peers</a:t>
+              <a:t>Variation in Data Size or Number of Peers</a:t>
             </a:r>
           </a:p>
           <a:p>
@@ -12113,7 +12117,7 @@
               <a:defRPr sz="1779"/>
             </a:pPr>
             <a:r>
-              <a:t>First Configuration Simulates Real Network Data for Performance Analysis</a:t>
+              <a:t>First Configuration for Real Network Data Simulation in Performance Analysis</a:t>
             </a:r>
           </a:p>
           <a:p>
@@ -12127,7 +12131,7 @@
               <a:defRPr sz="1779"/>
             </a:pPr>
             <a:r>
-              <a:t>Minimal Performance Difference between P2P and Server-Client Models Observed</a:t>
+              <a:t>Minimal Performance Difference Between P2P and Server-Client Models</a:t>
             </a:r>
           </a:p>
           <a:p>
@@ -12141,7 +12145,7 @@
               <a:defRPr sz="1779"/>
             </a:pPr>
             <a:r>
-              <a:t>Second Configuration Employs Varied Mean Values for Data Simulation</a:t>
+              <a:t>Second Configuration with Varied Mean Values for Data Simulation</a:t>
             </a:r>
           </a:p>
           <a:p>
@@ -12155,7 +12159,7 @@
               <a:defRPr sz="1779"/>
             </a:pPr>
             <a:r>
-              <a:t>P2P Algorithm Improved Efficiency with Increased Peers and Data Size</a:t>
+              <a:t>P2P Algorithm Efficiency Increase with More Peers and Larger Data Size</a:t>
             </a:r>
           </a:p>
           <a:p>
@@ -12169,7 +12173,7 @@
               <a:defRPr sz="1779"/>
             </a:pPr>
             <a:r>
-              <a:t>Small File Sizes Not Significantly Benefited by P2P Optimization</a:t>
+              <a:t>Small File Sizes Limited Benefit from P2P Optimization</a:t>
             </a:r>
           </a:p>
           <a:p>
@@ -12183,7 +12187,7 @@
               <a:defRPr sz="1779"/>
             </a:pPr>
             <a:r>
-              <a:t>Larger File Transfers Show P2P Algorithm Efficiency</a:t>
+              <a:t>Larger File Transfers Indicative of P2P Algorithm Efficiency</a:t>
             </a:r>
           </a:p>
           <a:p>
@@ -12197,11 +12201,11 @@
               <a:defRPr sz="1779"/>
             </a:pPr>
             <a:r>
-              <a:t>Different Average Speeds for Upload and Download in Configurations Affect Performance</a:t>
-            </a:r>
-          </a:p>
-          <a:p>
-            <a:pPr marL="178468" indent="-178468" defTabSz="813816">
+              <a:t>Variation in Average Upload and Download Speeds Across Configurations Affects Performance</a:t>
+            </a:r>
+          </a:p>
+          <a:p>
+            <a:pPr lvl="1" marL="517558" indent="-178468" defTabSz="813816">
               <a:spcBef>
                 <a:spcPts val="1000"/>
               </a:spcBef>
@@ -12211,21 +12215,7 @@
               <a:defRPr sz="1779"/>
             </a:pPr>
             <a:r>
-              <a:t>Higher Average Speeds in Second Configuration Enhance Network Efficiency, Reduce Bottlenecks</a:t>
-            </a:r>
-          </a:p>
-          <a:p>
-            <a:pPr marL="178468" indent="-178468" defTabSz="813816">
-              <a:spcBef>
-                <a:spcPts val="1000"/>
-              </a:spcBef>
-              <a:buClrTx/>
-              <a:buFontTx/>
-              <a:buChar char="•"/>
-              <a:defRPr sz="1779"/>
-            </a:pPr>
-            <a:r>
-              <a:t>P2P Algorithm Effectively Identifies and Utilizes Super Peers with Higher Capacity</a:t>
+              <a:t>Higher Average Speeds in Second Configuration for Enhanced Network Efficiency, Bottleneck Reduction</a:t>
             </a:r>
           </a:p>
         </p:txBody>
@@ -12258,13 +12248,17 @@
       </p:grpSpPr>
       <p:sp>
         <p:nvSpPr>
-          <p:cNvPr id="532" name="Performance Evaluation of P2P Algorithm, RQ2.2 and RQ2.3 (2)"/>
+          <p:cNvPr id="533" name="Performance Evaluation of P2P Algorithm, RQ2.2 and RQ2.3 (2)"/>
           <p:cNvSpPr txBox="1"/>
           <p:nvPr>
             <p:ph type="title"/>
           </p:nvPr>
         </p:nvSpPr>
         <p:spPr>
+          <a:xfrm>
+            <a:off x="1097280" y="509246"/>
+            <a:ext cx="10058401" cy="696895"/>
+          </a:xfrm>
           <a:prstGeom prst="rect">
             <a:avLst/>
           </a:prstGeom>
@@ -12286,7 +12280,7 @@
       </p:sp>
       <p:sp>
         <p:nvSpPr>
-          <p:cNvPr id="533" name="Date Placeholder 3"/>
+          <p:cNvPr id="534" name="Date Placeholder 3"/>
           <p:cNvSpPr txBox="1"/>
           <p:nvPr/>
         </p:nvSpPr>
@@ -12330,7 +12324,7 @@
       </p:sp>
       <p:sp>
         <p:nvSpPr>
-          <p:cNvPr id="534" name="Footer Placeholder 4"/>
+          <p:cNvPr id="535" name="Footer Placeholder 4"/>
           <p:cNvSpPr txBox="1"/>
           <p:nvPr/>
         </p:nvSpPr>
@@ -12376,7 +12370,7 @@
       </p:sp>
       <p:sp>
         <p:nvSpPr>
-          <p:cNvPr id="535" name="Slide Number"/>
+          <p:cNvPr id="536" name="Slide Number"/>
           <p:cNvSpPr txBox="1"/>
           <p:nvPr>
             <p:ph type="sldNum" sz="quarter" idx="4294967295"/>
@@ -12403,7 +12397,7 @@
       </p:sp>
       <p:pic>
         <p:nvPicPr>
-          <p:cNvPr id="536" name="implemantation2_20_peers_increasingfile.png" descr="implemantation2_20_peers_increasingfile.png"/>
+          <p:cNvPr id="537" name="implemantation2_20_peers_increasingfile.png" descr="implemantation2_20_peers_increasingfile.png"/>
           <p:cNvPicPr>
             <a:picLocks noChangeAspect="1"/>
           </p:cNvPicPr>
@@ -12432,7 +12426,7 @@
       </p:pic>
       <p:sp>
         <p:nvSpPr>
-          <p:cNvPr id="537" name="First Configuration with lectureStudio Server and 20 Peers…"/>
+          <p:cNvPr id="538" name="First Configuration with lectureStudio Server and 20 Peers…"/>
           <p:cNvSpPr txBox="1"/>
           <p:nvPr>
             <p:ph type="body" sz="half" idx="1"/>
@@ -12524,7 +12518,7 @@
       </p:sp>
       <p:sp>
         <p:nvSpPr>
-          <p:cNvPr id="538" name="Configuration of Containerlab File"/>
+          <p:cNvPr id="539" name="Configuration of Containerlab File"/>
           <p:cNvSpPr txBox="1"/>
           <p:nvPr/>
         </p:nvSpPr>
@@ -12578,7 +12572,7 @@
       </p:sp>
       <p:sp>
         <p:nvSpPr>
-          <p:cNvPr id="539" name="Configuration of Containerlab File"/>
+          <p:cNvPr id="540" name="Configuration of Containerlab File"/>
           <p:cNvSpPr txBox="1"/>
           <p:nvPr/>
         </p:nvSpPr>
@@ -12632,7 +12626,7 @@
       </p:sp>
       <p:pic>
         <p:nvPicPr>
-          <p:cNvPr id="540" name="implemantation1_20_peers_increasingfile.png" descr="implemantation1_20_peers_increasingfile.png"/>
+          <p:cNvPr id="541" name="implemantation1_20_peers_increasingfile.png" descr="implemantation1_20_peers_increasingfile.png"/>
           <p:cNvPicPr>
             <a:picLocks noChangeAspect="1"/>
           </p:cNvPicPr>
@@ -12687,13 +12681,17 @@
       </p:grpSpPr>
       <p:sp>
         <p:nvSpPr>
-          <p:cNvPr id="542" name="Performance Evaluation of P2P Algorithm, RQ2.2 and RQ2.3 (3)"/>
+          <p:cNvPr id="543" name="Performance Evaluation of P2P Algorithm, RQ2.2 and RQ2.3 (3)"/>
           <p:cNvSpPr txBox="1"/>
           <p:nvPr>
             <p:ph type="title"/>
           </p:nvPr>
         </p:nvSpPr>
         <p:spPr>
+          <a:xfrm>
+            <a:off x="1097280" y="571971"/>
+            <a:ext cx="10058401" cy="634170"/>
+          </a:xfrm>
           <a:prstGeom prst="rect">
             <a:avLst/>
           </a:prstGeom>
@@ -12715,7 +12713,7 @@
       </p:sp>
       <p:sp>
         <p:nvSpPr>
-          <p:cNvPr id="543" name="Date Placeholder 3"/>
+          <p:cNvPr id="544" name="Date Placeholder 3"/>
           <p:cNvSpPr txBox="1"/>
           <p:nvPr/>
         </p:nvSpPr>
@@ -12759,7 +12757,7 @@
       </p:sp>
       <p:sp>
         <p:nvSpPr>
-          <p:cNvPr id="544" name="Footer Placeholder 4"/>
+          <p:cNvPr id="545" name="Footer Placeholder 4"/>
           <p:cNvSpPr txBox="1"/>
           <p:nvPr/>
         </p:nvSpPr>
@@ -12805,7 +12803,7 @@
       </p:sp>
       <p:sp>
         <p:nvSpPr>
-          <p:cNvPr id="545" name="Slide Number"/>
+          <p:cNvPr id="546" name="Slide Number"/>
           <p:cNvSpPr txBox="1"/>
           <p:nvPr>
             <p:ph type="sldNum" sz="quarter" idx="4294967295"/>
@@ -12832,7 +12830,7 @@
       </p:sp>
       <p:pic>
         <p:nvPicPr>
-          <p:cNvPr id="546" name="implemantation2_50_peers_increasingfile.png" descr="implemantation2_50_peers_increasingfile.png"/>
+          <p:cNvPr id="547" name="implemantation2_50_peers_increasingfile.png" descr="implemantation2_50_peers_increasingfile.png"/>
           <p:cNvPicPr>
             <a:picLocks noChangeAspect="1"/>
           </p:cNvPicPr>
@@ -12861,7 +12859,7 @@
       </p:pic>
       <p:sp>
         <p:nvSpPr>
-          <p:cNvPr id="547" name="Configuration of Containerlab File"/>
+          <p:cNvPr id="548" name="Configuration of Containerlab File"/>
           <p:cNvSpPr txBox="1"/>
           <p:nvPr/>
         </p:nvSpPr>
@@ -12915,7 +12913,7 @@
       </p:sp>
       <p:sp>
         <p:nvSpPr>
-          <p:cNvPr id="548" name="Configuration of Containerlab File"/>
+          <p:cNvPr id="549" name="Configuration of Containerlab File"/>
           <p:cNvSpPr txBox="1"/>
           <p:nvPr/>
         </p:nvSpPr>
@@ -12969,7 +12967,7 @@
       </p:sp>
       <p:sp>
         <p:nvSpPr>
-          <p:cNvPr id="549" name="First Configuration with lectureStudio Server and 50 Peers…"/>
+          <p:cNvPr id="550" name="First Configuration with lectureStudio Server and 50 Peers…"/>
           <p:cNvSpPr txBox="1"/>
           <p:nvPr>
             <p:ph type="body" sz="half" idx="1"/>
@@ -13075,7 +13073,7 @@
       </p:sp>
       <p:pic>
         <p:nvPicPr>
-          <p:cNvPr id="550" name="implemantation1_50_peers_increasingfile.png" descr="implemantation1_50_peers_increasingfile.png"/>
+          <p:cNvPr id="551" name="implemantation1_50_peers_increasingfile.png" descr="implemantation1_50_peers_increasingfile.png"/>
           <p:cNvPicPr>
             <a:picLocks noChangeAspect="1"/>
           </p:cNvPicPr>
@@ -13130,7 +13128,7 @@
       </p:grpSpPr>
       <p:sp>
         <p:nvSpPr>
-          <p:cNvPr id="552" name="Challenges"/>
+          <p:cNvPr id="553" name="Challenges"/>
           <p:cNvSpPr txBox="1"/>
           <p:nvPr>
             <p:ph type="title"/>
@@ -13154,7 +13152,7 @@
       </p:sp>
       <p:sp>
         <p:nvSpPr>
-          <p:cNvPr id="553" name="Finding real network dataset…"/>
+          <p:cNvPr id="554" name="Finding real network dataset…"/>
           <p:cNvSpPr txBox="1"/>
           <p:nvPr>
             <p:ph type="body" idx="1"/>
@@ -13272,7 +13270,7 @@
       </p:sp>
       <p:sp>
         <p:nvSpPr>
-          <p:cNvPr id="554" name="Date Placeholder 3"/>
+          <p:cNvPr id="555" name="Date Placeholder 3"/>
           <p:cNvSpPr txBox="1"/>
           <p:nvPr/>
         </p:nvSpPr>
@@ -13316,7 +13314,7 @@
       </p:sp>
       <p:sp>
         <p:nvSpPr>
-          <p:cNvPr id="555" name="Footer Placeholder 4"/>
+          <p:cNvPr id="556" name="Footer Placeholder 4"/>
           <p:cNvSpPr txBox="1"/>
           <p:nvPr/>
         </p:nvSpPr>
@@ -13362,7 +13360,7 @@
       </p:sp>
       <p:sp>
         <p:nvSpPr>
-          <p:cNvPr id="556" name="Slide Number"/>
+          <p:cNvPr id="557" name="Slide Number"/>
           <p:cNvSpPr txBox="1"/>
           <p:nvPr>
             <p:ph type="sldNum" sz="quarter" idx="4294967295"/>
@@ -13415,7 +13413,7 @@
       </p:grpSpPr>
       <p:sp>
         <p:nvSpPr>
-          <p:cNvPr id="558" name="Conclusion and Future Work"/>
+          <p:cNvPr id="559" name="Conclusion and Future Work"/>
           <p:cNvSpPr txBox="1"/>
           <p:nvPr>
             <p:ph type="title"/>
@@ -13439,7 +13437,7 @@
       </p:sp>
       <p:sp>
         <p:nvSpPr>
-          <p:cNvPr id="559" name="Goal: Develop a Testbed for P2P Data Distribution Algorithm…"/>
+          <p:cNvPr id="560" name="Goal: Develop a Testbed for the P2P Data Distribution Algorithm…"/>
           <p:cNvSpPr txBox="1"/>
           <p:nvPr>
             <p:ph type="body" idx="1"/>
@@ -13464,7 +13462,21 @@
               <a:defRPr sz="1779"/>
             </a:pPr>
             <a:r>
-              <a:t>Goal: Develop a Testbed for P2P Data Distribution Algorithm</a:t>
+              <a:t>Goal: Develop a Testbed for the P2P Data Distribution Algorithm</a:t>
+            </a:r>
+          </a:p>
+          <a:p>
+            <a:pPr lvl="1" marL="517558" indent="-178468" defTabSz="813816">
+              <a:spcBef>
+                <a:spcPts val="1000"/>
+              </a:spcBef>
+              <a:buClrTx/>
+              <a:buFontTx/>
+              <a:buChar char="•"/>
+              <a:defRPr sz="1779"/>
+            </a:pPr>
+            <a:r>
+              <a:t>Utilization of Docker and Containerlab for An Efficient, Isolated Testing Environment</a:t>
             </a:r>
           </a:p>
           <a:p>
@@ -13478,7 +13490,35 @@
               <a:defRPr sz="1779"/>
             </a:pPr>
             <a:r>
-              <a:t>Utilization of Docker and Containerlab for An Efficient, Isolated Testing Environment.</a:t>
+              <a:t>Simulation of Real Network Environments and Complex Network Topologies</a:t>
+            </a:r>
+          </a:p>
+          <a:p>
+            <a:pPr lvl="1" marL="517558" indent="-178468" defTabSz="813816">
+              <a:spcBef>
+                <a:spcPts val="1000"/>
+              </a:spcBef>
+              <a:buClrTx/>
+              <a:buFontTx/>
+              <a:buChar char="•"/>
+              <a:defRPr sz="1779"/>
+            </a:pPr>
+            <a:r>
+              <a:t>High Replication Accuracy of Bandwidth and Latency</a:t>
+            </a:r>
+          </a:p>
+          <a:p>
+            <a:pPr lvl="1" marL="517558" indent="-178468" defTabSz="813816">
+              <a:spcBef>
+                <a:spcPts val="1000"/>
+              </a:spcBef>
+              <a:buClrTx/>
+              <a:buFontTx/>
+              <a:buChar char="•"/>
+              <a:defRPr sz="1779"/>
+            </a:pPr>
+            <a:r>
+              <a:t>Effective Scalability with Increasing Nodes</a:t>
             </a:r>
           </a:p>
           <a:p>
@@ -13492,7 +13532,21 @@
               <a:defRPr sz="1779"/>
             </a:pPr>
             <a:r>
-              <a:t>Simulation of Real Network Environments and Complex Network Topologies</a:t>
+              <a:t>High Resource Demand without the P2P Algorithm; Significant Reduction with the P2P Algorithm</a:t>
+            </a:r>
+          </a:p>
+          <a:p>
+            <a:pPr lvl="1" marL="517558" indent="-178468" defTabSz="813816">
+              <a:spcBef>
+                <a:spcPts val="1000"/>
+              </a:spcBef>
+              <a:buClrTx/>
+              <a:buFontTx/>
+              <a:buChar char="•"/>
+              <a:defRPr sz="1779"/>
+            </a:pPr>
+            <a:r>
+              <a:t>Effective Data Distribution and Reduced Server Load through the P2P Algorithm</a:t>
             </a:r>
           </a:p>
           <a:p>
@@ -13506,7 +13560,7 @@
               <a:defRPr sz="1779"/>
             </a:pPr>
             <a:r>
-              <a:t>High Replication Accuracy of Bandwidth and Latency</a:t>
+              <a:t>Limited P2P Benefits for Small Files and Efficiency Improvements in Different Configurations</a:t>
             </a:r>
           </a:p>
           <a:p>
@@ -13520,7 +13574,7 @@
               <a:defRPr sz="1779"/>
             </a:pPr>
             <a:r>
-              <a:t>Effective Scalability with Increasing Nodes</a:t>
+              <a:t>Robustness of P2P Algorithm with Increased Peers and Data Size</a:t>
             </a:r>
           </a:p>
           <a:p>
@@ -13534,7 +13588,7 @@
               <a:defRPr sz="1779"/>
             </a:pPr>
             <a:r>
-              <a:t>High resource demand without P2P Algorithm; significant reduction with P2P Algorithm</a:t>
+              <a:t>Enhancement of Packet Loss Simulation for Accurate Network Behavior</a:t>
             </a:r>
           </a:p>
           <a:p>
@@ -13548,7 +13602,7 @@
               <a:defRPr sz="1779"/>
             </a:pPr>
             <a:r>
-              <a:t>Effective Data Distribution and Reduced Server Load through P2P Algorithm</a:t>
+              <a:t>Automation Between the Testbed and the P2P Algorithm Optimization</a:t>
             </a:r>
           </a:p>
           <a:p>
@@ -13562,70 +13616,14 @@
               <a:defRPr sz="1779"/>
             </a:pPr>
             <a:r>
-              <a:t>Limited P2P Benefits for Small Files and Efficiency Improvements in Different Configurations</a:t>
-            </a:r>
-          </a:p>
-          <a:p>
-            <a:pPr marL="178468" indent="-178468" defTabSz="813816">
-              <a:spcBef>
-                <a:spcPts val="1000"/>
-              </a:spcBef>
-              <a:buClrTx/>
-              <a:buFontTx/>
-              <a:buChar char="•"/>
-              <a:defRPr sz="1779"/>
-            </a:pPr>
-            <a:r>
-              <a:t>Robustness of P2P Algorithm with Increased Peers and Data Size</a:t>
-            </a:r>
-          </a:p>
-          <a:p>
-            <a:pPr marL="178468" indent="-178468" defTabSz="813816">
-              <a:spcBef>
-                <a:spcPts val="1000"/>
-              </a:spcBef>
-              <a:buClrTx/>
-              <a:buFontTx/>
-              <a:buChar char="•"/>
-              <a:defRPr sz="1779"/>
-            </a:pPr>
-            <a:r>
-              <a:t>Enhancement of Packet Loss Simulation for Accurate Network Behavior</a:t>
-            </a:r>
-          </a:p>
-          <a:p>
-            <a:pPr marL="178468" indent="-178468" defTabSz="813816">
-              <a:spcBef>
-                <a:spcPts val="1000"/>
-              </a:spcBef>
-              <a:buClrTx/>
-              <a:buFontTx/>
-              <a:buChar char="•"/>
-              <a:defRPr sz="1779"/>
-            </a:pPr>
-            <a:r>
-              <a:t>Automation Between Testbed and P2P Algorithm Optimization</a:t>
-            </a:r>
-          </a:p>
-          <a:p>
-            <a:pPr marL="178468" indent="-178468" defTabSz="813816">
-              <a:spcBef>
-                <a:spcPts val="1000"/>
-              </a:spcBef>
-              <a:buClrTx/>
-              <a:buFontTx/>
-              <a:buChar char="•"/>
-              <a:defRPr sz="1779"/>
-            </a:pPr>
-            <a:r>
-              <a:t>Development of A Graphical Testbed interface for Easier Configuration and Real-Time Analysis</a:t>
-            </a:r>
-          </a:p>
-        </p:txBody>
-      </p:sp>
-      <p:sp>
-        <p:nvSpPr>
-          <p:cNvPr id="560" name="Date Placeholder 3"/>
+              <a:t>Development of A Graphical Testbed Interface for Easier Configuration and Real-Time Analysis</a:t>
+            </a:r>
+          </a:p>
+        </p:txBody>
+      </p:sp>
+      <p:sp>
+        <p:nvSpPr>
+          <p:cNvPr id="561" name="Date Placeholder 3"/>
           <p:cNvSpPr txBox="1"/>
           <p:nvPr/>
         </p:nvSpPr>
@@ -13669,7 +13667,7 @@
       </p:sp>
       <p:sp>
         <p:nvSpPr>
-          <p:cNvPr id="561" name="Footer Placeholder 4"/>
+          <p:cNvPr id="562" name="Footer Placeholder 4"/>
           <p:cNvSpPr txBox="1"/>
           <p:nvPr/>
         </p:nvSpPr>
@@ -13715,7 +13713,7 @@
       </p:sp>
       <p:sp>
         <p:nvSpPr>
-          <p:cNvPr id="562" name="Slide Number"/>
+          <p:cNvPr id="563" name="Slide Number"/>
           <p:cNvSpPr txBox="1"/>
           <p:nvPr>
             <p:ph type="sldNum" sz="quarter" idx="4294967295"/>
@@ -13768,7 +13766,7 @@
       </p:grpSpPr>
       <p:sp>
         <p:nvSpPr>
-          <p:cNvPr id="564" name="Title 6"/>
+          <p:cNvPr id="565" name="Title 6"/>
           <p:cNvSpPr txBox="1"/>
           <p:nvPr>
             <p:ph type="title"/>
@@ -13800,7 +13798,7 @@
       </p:sp>
       <p:sp>
         <p:nvSpPr>
-          <p:cNvPr id="565" name="Text Placeholder 7"/>
+          <p:cNvPr id="566" name="Text Placeholder 7"/>
           <p:cNvSpPr txBox="1"/>
           <p:nvPr>
             <p:ph type="body" sz="quarter" idx="1"/>
@@ -13830,7 +13828,7 @@
       </p:sp>
       <p:sp>
         <p:nvSpPr>
-          <p:cNvPr id="566" name="Slide Number Placeholder 5"/>
+          <p:cNvPr id="567" name="Slide Number Placeholder 5"/>
           <p:cNvSpPr txBox="1"/>
           <p:nvPr>
             <p:ph type="sldNum" sz="quarter" idx="4294967295"/>
@@ -13861,7 +13859,7 @@
       </p:sp>
       <p:sp>
         <p:nvSpPr>
-          <p:cNvPr id="567" name="Footer Placeholder 4"/>
+          <p:cNvPr id="568" name="Footer Placeholder 4"/>
           <p:cNvSpPr txBox="1"/>
           <p:nvPr/>
         </p:nvSpPr>
@@ -13907,7 +13905,7 @@
       </p:sp>
       <p:sp>
         <p:nvSpPr>
-          <p:cNvPr id="568" name="Date Placeholder 3"/>
+          <p:cNvPr id="569" name="Date Placeholder 3"/>
           <p:cNvSpPr txBox="1"/>
           <p:nvPr/>
         </p:nvSpPr>
@@ -13977,7 +13975,7 @@
       </p:grpSpPr>
       <p:sp>
         <p:nvSpPr>
-          <p:cNvPr id="570" name="References"/>
+          <p:cNvPr id="571" name="References"/>
           <p:cNvSpPr txBox="1"/>
           <p:nvPr>
             <p:ph type="title"/>
@@ -14007,7 +14005,7 @@
       </p:sp>
       <p:sp>
         <p:nvSpPr>
-          <p:cNvPr id="571" name="[1] https://www.data.gov.uk/dataset/dfe843da-06ca-4680-9ba0-fbb27319e402/uk-fixed-line-broadband-performance…"/>
+          <p:cNvPr id="572" name="[1] https://www.data.gov.uk/dataset/dfe843da-06ca-4680-9ba0-fbb27319e402/uk-fixed-line-broadband-performance…"/>
           <p:cNvSpPr txBox="1"/>
           <p:nvPr>
             <p:ph type="body" idx="1"/>
@@ -14065,6 +14063,26 @@
                 </a:uFill>
                 <a:hlinkClick r:id="rId3" invalidUrl="" action="" tgtFrame="" tooltip="" history="1" highlightClick="0" endSnd="0"/>
               </a:rPr>
+              <a:t>https://www.speedtest.net/</a:t>
+            </a:r>
+          </a:p>
+          <a:p>
+            <a:pPr/>
+            <a:r>
+              <a:t>[3] </a:t>
+            </a:r>
+            <a:r>
+              <a:rPr u="sng">
+                <a:solidFill>
+                  <a:srgbClr val="0000FF"/>
+                </a:solidFill>
+                <a:uFill>
+                  <a:solidFill>
+                    <a:srgbClr val="0000FF"/>
+                  </a:solidFill>
+                </a:uFill>
+                <a:hlinkClick r:id="rId4" invalidUrl="" action="" tgtFrame="" tooltip="" history="1" highlightClick="0" endSnd="0"/>
+              </a:rPr>
               <a:t>https://containerlab.dev/manual/topo-def-file/</a:t>
             </a:r>
           </a:p>
@@ -14072,7 +14090,7 @@
       </p:sp>
       <p:sp>
         <p:nvSpPr>
-          <p:cNvPr id="572" name="Slide Number"/>
+          <p:cNvPr id="573" name="Slide Number"/>
           <p:cNvSpPr txBox="1"/>
           <p:nvPr>
             <p:ph type="sldNum" sz="quarter" idx="4294967295"/>
@@ -14103,7 +14121,7 @@
       </p:sp>
       <p:sp>
         <p:nvSpPr>
-          <p:cNvPr id="573" name="Footer Placeholder 4"/>
+          <p:cNvPr id="574" name="Footer Placeholder 4"/>
           <p:cNvSpPr txBox="1"/>
           <p:nvPr/>
         </p:nvSpPr>
@@ -14149,7 +14167,7 @@
       </p:sp>
       <p:sp>
         <p:nvSpPr>
-          <p:cNvPr id="574" name="Date Placeholder 3"/>
+          <p:cNvPr id="575" name="Date Placeholder 3"/>
           <p:cNvSpPr txBox="1"/>
           <p:nvPr/>
         </p:nvSpPr>
@@ -14569,7 +14587,7 @@
               <a:defRPr sz="1653"/>
             </a:pPr>
             <a:r>
-              <a:t>Analyzing of Resource Efficiency of the P2P Algorithm Components (lectureStudio server and peers)</a:t>
+              <a:t>Analyzing of Resource Efficiency of the P2P Algorithm Components (LectureStudio Server and Peers)</a:t>
             </a:r>
           </a:p>
           <a:p>
@@ -15718,7 +15736,7 @@
               <a:buChar char="•"/>
             </a:pPr>
             <a:r>
-              <a:t>Implementing Traditional Server-Client Based Method</a:t>
+              <a:t>Implementing the Traditional Server-Client Based Approach</a:t>
             </a:r>
           </a:p>
           <a:p>
@@ -15967,7 +15985,7 @@
           <p:nvPr/>
         </p:nvGraphicFramePr>
         <p:xfrm>
-          <a:off x="2578733" y="4500824"/>
+          <a:off x="2312033" y="4500824"/>
           <a:ext cx="10075682" cy="1955125"/>
         </p:xfrm>
         <a:graphic xmlns:a="http://schemas.openxmlformats.org/drawingml/2006/main">
@@ -16275,6 +16293,57 @@
           </a:p>
         </p:txBody>
       </p:sp>
+      <p:sp>
+        <p:nvSpPr>
+          <p:cNvPr id="219" name="[2]"/>
+          <p:cNvSpPr txBox="1"/>
+          <p:nvPr/>
+        </p:nvSpPr>
+        <p:spPr>
+          <a:xfrm>
+            <a:off x="10114279" y="5655894"/>
+            <a:ext cx="619597" cy="457200"/>
+          </a:xfrm>
+          <a:prstGeom prst="rect">
+            <a:avLst/>
+          </a:prstGeom>
+          <a:ln w="12700">
+            <a:miter lim="400000"/>
+          </a:ln>
+          <a:extLst>
+            <a:ext uri="{C572A759-6A51-4108-AA02-DFA0A04FC94B}">
+              <ma14:wrappingTextBoxFlag xmlns:ma14="http://schemas.microsoft.com/office/mac/drawingml/2011/main" val="1"/>
+            </a:ext>
+          </a:extLst>
+        </p:spPr>
+        <p:txBody>
+          <a:bodyPr lIns="45718" tIns="45718" rIns="45718" bIns="45718" anchor="b">
+            <a:normAutofit fontScale="100000" lnSpcReduction="0"/>
+          </a:bodyPr>
+          <a:lstStyle>
+            <a:lvl1pPr defTabSz="722376">
+              <a:lnSpc>
+                <a:spcPct val="85000"/>
+              </a:lnSpc>
+              <a:defRPr spc="-100">
+                <a:solidFill>
+                  <a:srgbClr val="404040"/>
+                </a:solidFill>
+                <a:latin typeface="Calibri Light"/>
+                <a:ea typeface="Calibri Light"/>
+                <a:cs typeface="Calibri Light"/>
+                <a:sym typeface="Calibri Light"/>
+              </a:defRPr>
+            </a:lvl1pPr>
+          </a:lstStyle>
+          <a:p>
+            <a:pPr/>
+            <a:r>
+              <a:t>[1], [2]</a:t>
+            </a:r>
+          </a:p>
+        </p:txBody>
+      </p:sp>
     </p:spTree>
   </p:cSld>
   <p:clrMapOvr>
@@ -16303,7 +16372,7 @@
       </p:grpSpPr>
       <p:sp>
         <p:nvSpPr>
-          <p:cNvPr id="220" name="Network Topology Generator"/>
+          <p:cNvPr id="221" name="Network Topology Generator"/>
           <p:cNvSpPr txBox="1"/>
           <p:nvPr>
             <p:ph type="title"/>
@@ -16335,7 +16404,7 @@
       </p:sp>
       <p:sp>
         <p:nvSpPr>
-          <p:cNvPr id="221" name="Slide Number"/>
+          <p:cNvPr id="222" name="Slide Number"/>
           <p:cNvSpPr txBox="1"/>
           <p:nvPr>
             <p:ph type="sldNum" sz="quarter" idx="4294967295"/>
@@ -16366,7 +16435,7 @@
       </p:sp>
       <p:sp>
         <p:nvSpPr>
-          <p:cNvPr id="222" name="Footer Placeholder 4"/>
+          <p:cNvPr id="223" name="Footer Placeholder 4"/>
           <p:cNvSpPr txBox="1"/>
           <p:nvPr/>
         </p:nvSpPr>
@@ -16408,7 +16477,7 @@
       </p:sp>
       <p:sp>
         <p:nvSpPr>
-          <p:cNvPr id="223" name="{…"/>
+          <p:cNvPr id="224" name="{…"/>
           <p:cNvSpPr txBox="1"/>
           <p:nvPr/>
         </p:nvSpPr>
@@ -16771,7 +16840,7 @@
       </p:sp>
       <p:sp>
         <p:nvSpPr>
-          <p:cNvPr id="224" name="&quot;connections&quot;: […"/>
+          <p:cNvPr id="225" name="&quot;connections&quot;: […"/>
           <p:cNvSpPr txBox="1"/>
           <p:nvPr/>
         </p:nvSpPr>
@@ -17174,7 +17243,7 @@
       </p:sp>
       <p:sp>
         <p:nvSpPr>
-          <p:cNvPr id="225" name="List of Peers and Network Characteristics"/>
+          <p:cNvPr id="226" name="List of Peers and Network Characteristics"/>
           <p:cNvSpPr txBox="1"/>
           <p:nvPr/>
         </p:nvSpPr>
@@ -17228,7 +17297,7 @@
       </p:sp>
       <p:pic>
         <p:nvPicPr>
-          <p:cNvPr id="226" name="136525.png" descr="136525.png"/>
+          <p:cNvPr id="227" name="136525.png" descr="136525.png"/>
           <p:cNvPicPr>
             <a:picLocks noChangeAspect="1"/>
           </p:cNvPicPr>
@@ -17257,7 +17326,7 @@
       </p:pic>
       <p:sp>
         <p:nvSpPr>
-          <p:cNvPr id="227" name="{…"/>
+          <p:cNvPr id="228" name="{…"/>
           <p:cNvSpPr txBox="1"/>
           <p:nvPr/>
         </p:nvSpPr>
@@ -17558,7 +17627,7 @@
       </p:sp>
       <p:sp>
         <p:nvSpPr>
-          <p:cNvPr id="228" name="Connection Between Peers"/>
+          <p:cNvPr id="229" name="Connection Between Peers"/>
           <p:cNvSpPr txBox="1"/>
           <p:nvPr/>
         </p:nvSpPr>
@@ -17612,7 +17681,7 @@
       </p:sp>
       <p:pic>
         <p:nvPicPr>
-          <p:cNvPr id="229" name="136525.png" descr="136525.png"/>
+          <p:cNvPr id="230" name="136525.png" descr="136525.png"/>
           <p:cNvPicPr>
             <a:picLocks noChangeAspect="1"/>
           </p:cNvPicPr>
@@ -17641,7 +17710,7 @@
       </p:pic>
       <p:sp>
         <p:nvSpPr>
-          <p:cNvPr id="230" name="Line"/>
+          <p:cNvPr id="231" name="Line"/>
           <p:cNvSpPr/>
           <p:nvPr/>
         </p:nvSpPr>
@@ -17671,7 +17740,7 @@
       </p:sp>
       <p:sp>
         <p:nvSpPr>
-          <p:cNvPr id="231" name="Date Placeholder 3"/>
+          <p:cNvPr id="232" name="Date Placeholder 3"/>
           <p:cNvSpPr txBox="1"/>
           <p:nvPr/>
         </p:nvSpPr>
@@ -17715,7 +17784,7 @@
       </p:sp>
       <p:sp>
         <p:nvSpPr>
-          <p:cNvPr id="232" name="Develop Java Program…"/>
+          <p:cNvPr id="233" name="Develop Java Program…"/>
           <p:cNvSpPr txBox="1"/>
           <p:nvPr>
             <p:ph type="body" sz="quarter" idx="1"/>
@@ -17734,42 +17803,42 @@
           <a:bodyPr/>
           <a:lstStyle/>
           <a:p>
-            <a:pPr marL="178468" indent="-178468" defTabSz="813816">
+            <a:pPr marL="186489" indent="-186489" defTabSz="850391">
               <a:spcBef>
-                <a:spcPts val="1000"/>
+                <a:spcPts val="1100"/>
               </a:spcBef>
               <a:buClrTx/>
               <a:buFontTx/>
               <a:buChar char="•"/>
-              <a:defRPr sz="1779"/>
-            </a:pPr>
-            <a:r>
-              <a:t>Generating Network Topology with the Testbed</a:t>
-            </a:r>
-          </a:p>
-          <a:p>
-            <a:pPr lvl="1" marL="517558" indent="-178468" defTabSz="813816">
+              <a:defRPr sz="1860"/>
+            </a:pPr>
+            <a:r>
+              <a:t>Generating Network Topology by the Testbed</a:t>
+            </a:r>
+          </a:p>
+          <a:p>
+            <a:pPr lvl="1" marL="540819" indent="-186489" defTabSz="850391">
               <a:spcBef>
-                <a:spcPts val="1000"/>
+                <a:spcPts val="1100"/>
               </a:spcBef>
               <a:buClrTx/>
               <a:buFontTx/>
               <a:buChar char="•"/>
-              <a:defRPr sz="1779"/>
+              <a:defRPr sz="1860"/>
             </a:pPr>
             <a:r>
               <a:t>Listing Nodes with Network Characteristics</a:t>
             </a:r>
           </a:p>
           <a:p>
-            <a:pPr lvl="1" marL="517558" indent="-178468" defTabSz="813816">
+            <a:pPr lvl="1" marL="540819" indent="-186489" defTabSz="850391">
               <a:spcBef>
-                <a:spcPts val="1000"/>
+                <a:spcPts val="1100"/>
               </a:spcBef>
               <a:buClrTx/>
               <a:buFontTx/>
               <a:buChar char="•"/>
-              <a:defRPr sz="1779"/>
+              <a:defRPr sz="1860"/>
             </a:pPr>
             <a:r>
               <a:t>Detailing Connections between LectureStudio Server and All Peers</a:t>
@@ -17779,7 +17848,7 @@
       </p:sp>
       <p:sp>
         <p:nvSpPr>
-          <p:cNvPr id="233" name="Develop Java Program…"/>
+          <p:cNvPr id="234" name="Develop Java Program…"/>
           <p:cNvSpPr txBox="1"/>
           <p:nvPr/>
         </p:nvSpPr>
@@ -17822,7 +17891,7 @@
               </a:defRPr>
             </a:pPr>
             <a:r>
-              <a:t>Optimizing Network Topology with the P2P Algorithm</a:t>
+              <a:t>Optimizing Network Topology by the P2P Algorithm</a:t>
             </a:r>
           </a:p>
           <a:p>
@@ -17895,7 +17964,7 @@
       </p:grpSpPr>
       <p:sp>
         <p:nvSpPr>
-          <p:cNvPr id="235" name="Management of Container-Testbed Environment"/>
+          <p:cNvPr id="236" name="Management of Container-Testbed Environment"/>
           <p:cNvSpPr txBox="1"/>
           <p:nvPr>
             <p:ph type="title"/>
@@ -17925,7 +17994,7 @@
       </p:sp>
       <p:sp>
         <p:nvSpPr>
-          <p:cNvPr id="236" name="Create and Deploy Applications Faster and More Securely…"/>
+          <p:cNvPr id="237" name="Create and Deploy Applications Faster and More Securely…"/>
           <p:cNvSpPr txBox="1"/>
           <p:nvPr>
             <p:ph type="body" idx="1"/>
@@ -18037,7 +18106,7 @@
       </p:sp>
       <p:sp>
         <p:nvSpPr>
-          <p:cNvPr id="237" name="Slide Number"/>
+          <p:cNvPr id="238" name="Slide Number"/>
           <p:cNvSpPr txBox="1"/>
           <p:nvPr>
             <p:ph type="sldNum" sz="quarter" idx="4294967295"/>
@@ -18068,7 +18137,7 @@
       </p:sp>
       <p:sp>
         <p:nvSpPr>
-          <p:cNvPr id="238" name="Footer Placeholder 4"/>
+          <p:cNvPr id="239" name="Footer Placeholder 4"/>
           <p:cNvSpPr txBox="1"/>
           <p:nvPr/>
         </p:nvSpPr>
@@ -18110,7 +18179,7 @@
       </p:sp>
       <p:sp>
         <p:nvSpPr>
-          <p:cNvPr id="239" name="[2]"/>
+          <p:cNvPr id="240" name="[2]"/>
           <p:cNvSpPr txBox="1"/>
           <p:nvPr/>
         </p:nvSpPr>
@@ -18154,14 +18223,14 @@
           <a:p>
             <a:pPr/>
             <a:r>
-              <a:t>[2]</a:t>
-            </a:r>
-          </a:p>
-        </p:txBody>
-      </p:sp>
-      <p:sp>
-        <p:nvSpPr>
-          <p:cNvPr id="240" name="name: p2p-network-topology…"/>
+              <a:t>[3]</a:t>
+            </a:r>
+          </a:p>
+        </p:txBody>
+      </p:sp>
+      <p:sp>
+        <p:nvSpPr>
+          <p:cNvPr id="241" name="name: p2p-network-topology…"/>
           <p:cNvSpPr txBox="1"/>
           <p:nvPr/>
         </p:nvSpPr>
@@ -18613,7 +18682,7 @@
       </p:sp>
       <p:sp>
         <p:nvSpPr>
-          <p:cNvPr id="241" name="Configuration of Containerlab File"/>
+          <p:cNvPr id="242" name="Configuration of Containerlab File"/>
           <p:cNvSpPr txBox="1"/>
           <p:nvPr/>
         </p:nvSpPr>
@@ -18667,7 +18736,7 @@
       </p:sp>
       <p:pic>
         <p:nvPicPr>
-          <p:cNvPr id="242" name="yaml-file-format-line-icon-free-vector.jpg" descr="yaml-file-format-line-icon-free-vector.jpg"/>
+          <p:cNvPr id="243" name="yaml-file-format-line-icon-free-vector.jpg" descr="yaml-file-format-line-icon-free-vector.jpg"/>
           <p:cNvPicPr>
             <a:picLocks noChangeAspect="1"/>
           </p:cNvPicPr>
@@ -18696,7 +18765,7 @@
       </p:pic>
       <p:sp>
         <p:nvSpPr>
-          <p:cNvPr id="243" name="Date Placeholder 3"/>
+          <p:cNvPr id="244" name="Date Placeholder 3"/>
           <p:cNvSpPr txBox="1"/>
           <p:nvPr/>
         </p:nvSpPr>
@@ -18740,7 +18809,7 @@
       </p:sp>
       <p:pic>
         <p:nvPicPr>
-          <p:cNvPr id="244" name="containerlabTestbed.png" descr="containerlabTestbed.png"/>
+          <p:cNvPr id="245" name="containerlabTestbed.png" descr="containerlabTestbed.png"/>
           <p:cNvPicPr>
             <a:picLocks noChangeAspect="1"/>
           </p:cNvPicPr>
@@ -18769,7 +18838,7 @@
       </p:pic>
       <p:pic>
         <p:nvPicPr>
-          <p:cNvPr id="245" name="Screenshot 2024-03-13 at 19.19.39.png" descr="Screenshot 2024-03-13 at 19.19.39.png"/>
+          <p:cNvPr id="246" name="Screenshot 2024-03-13 at 19.19.39.png" descr="Screenshot 2024-03-13 at 19.19.39.png"/>
           <p:cNvPicPr>
             <a:picLocks noChangeAspect="1"/>
           </p:cNvPicPr>
@@ -18824,7 +18893,7 @@
       </p:grpSpPr>
       <p:sp>
         <p:nvSpPr>
-          <p:cNvPr id="247" name="Rounded Rectangle"/>
+          <p:cNvPr id="248" name="Rounded Rectangle"/>
           <p:cNvSpPr/>
           <p:nvPr/>
         </p:nvSpPr>
@@ -18858,7 +18927,7 @@
       </p:sp>
       <p:sp>
         <p:nvSpPr>
-          <p:cNvPr id="248" name="Square"/>
+          <p:cNvPr id="249" name="Square"/>
           <p:cNvSpPr/>
           <p:nvPr/>
         </p:nvSpPr>
@@ -18890,7 +18959,7 @@
       </p:sp>
       <p:sp>
         <p:nvSpPr>
-          <p:cNvPr id="249" name="Circle"/>
+          <p:cNvPr id="250" name="Circle"/>
           <p:cNvSpPr/>
           <p:nvPr/>
         </p:nvSpPr>
@@ -18921,7 +18990,7 @@
       </p:sp>
       <p:sp>
         <p:nvSpPr>
-          <p:cNvPr id="250" name="Shape"/>
+          <p:cNvPr id="251" name="Shape"/>
           <p:cNvSpPr/>
           <p:nvPr/>
         </p:nvSpPr>
@@ -18986,7 +19055,7 @@
       </p:sp>
       <p:sp>
         <p:nvSpPr>
-          <p:cNvPr id="251" name="Java…"/>
+          <p:cNvPr id="252" name="Java…"/>
           <p:cNvSpPr txBox="1"/>
           <p:nvPr/>
         </p:nvSpPr>
@@ -19026,7 +19095,7 @@
       </p:sp>
       <p:sp>
         <p:nvSpPr>
-          <p:cNvPr id="252" name="Java…"/>
+          <p:cNvPr id="253" name="Java…"/>
           <p:cNvSpPr txBox="1"/>
           <p:nvPr/>
         </p:nvSpPr>
@@ -19066,7 +19135,7 @@
       </p:sp>
       <p:sp>
         <p:nvSpPr>
-          <p:cNvPr id="253" name="Java…"/>
+          <p:cNvPr id="254" name="Java…"/>
           <p:cNvSpPr txBox="1"/>
           <p:nvPr/>
         </p:nvSpPr>
@@ -19106,7 +19175,7 @@
       </p:sp>
       <p:sp>
         <p:nvSpPr>
-          <p:cNvPr id="254" name="Java…"/>
+          <p:cNvPr id="255" name="Java…"/>
           <p:cNvSpPr txBox="1"/>
           <p:nvPr/>
         </p:nvSpPr>
@@ -19146,7 +19215,7 @@
       </p:sp>
       <p:pic>
         <p:nvPicPr>
-          <p:cNvPr id="255" name="473791.png" descr="473791.png"/>
+          <p:cNvPr id="256" name="473791.png" descr="473791.png"/>
           <p:cNvPicPr>
             <a:picLocks noChangeAspect="1"/>
           </p:cNvPicPr>
@@ -19175,7 +19244,7 @@
       </p:pic>
       <p:pic>
         <p:nvPicPr>
-          <p:cNvPr id="256" name="yaml-file-format-line-icon-free-vector.jpg" descr="yaml-file-format-line-icon-free-vector.jpg"/>
+          <p:cNvPr id="257" name="yaml-file-format-line-icon-free-vector.jpg" descr="yaml-file-format-line-icon-free-vector.jpg"/>
           <p:cNvPicPr>
             <a:picLocks noChangeAspect="1"/>
           </p:cNvPicPr>
@@ -19204,7 +19273,7 @@
       </p:pic>
       <p:pic>
         <p:nvPicPr>
-          <p:cNvPr id="257" name="1654914-200.png" descr="1654914-200.png"/>
+          <p:cNvPr id="258" name="1654914-200.png" descr="1654914-200.png"/>
           <p:cNvPicPr>
             <a:picLocks noChangeAspect="1"/>
           </p:cNvPicPr>
@@ -19233,7 +19302,7 @@
       </p:pic>
       <p:sp>
         <p:nvSpPr>
-          <p:cNvPr id="258" name="Java…"/>
+          <p:cNvPr id="259" name="Java…"/>
           <p:cNvSpPr txBox="1"/>
           <p:nvPr/>
         </p:nvSpPr>
@@ -19273,7 +19342,7 @@
       </p:sp>
       <p:pic>
         <p:nvPicPr>
-          <p:cNvPr id="259" name="images.png" descr="images.png"/>
+          <p:cNvPr id="260" name="images.png" descr="images.png"/>
           <p:cNvPicPr>
             <a:picLocks noChangeAspect="1"/>
           </p:cNvPicPr>
@@ -19302,7 +19371,7 @@
       </p:pic>
       <p:sp>
         <p:nvSpPr>
-          <p:cNvPr id="260" name="Oval"/>
+          <p:cNvPr id="261" name="Oval"/>
           <p:cNvSpPr/>
           <p:nvPr/>
         </p:nvSpPr>
@@ -19333,7 +19402,7 @@
       </p:sp>
       <p:sp>
         <p:nvSpPr>
-          <p:cNvPr id="261" name="1"/>
+          <p:cNvPr id="262" name="1"/>
           <p:cNvSpPr txBox="1"/>
           <p:nvPr/>
         </p:nvSpPr>
@@ -19371,7 +19440,7 @@
       </p:sp>
       <p:sp>
         <p:nvSpPr>
-          <p:cNvPr id="262" name="Oval"/>
+          <p:cNvPr id="263" name="Oval"/>
           <p:cNvSpPr/>
           <p:nvPr/>
         </p:nvSpPr>
@@ -19402,7 +19471,7 @@
       </p:sp>
       <p:sp>
         <p:nvSpPr>
-          <p:cNvPr id="263" name="4"/>
+          <p:cNvPr id="264" name="4"/>
           <p:cNvSpPr txBox="1"/>
           <p:nvPr/>
         </p:nvSpPr>
@@ -19440,7 +19509,7 @@
       </p:sp>
       <p:sp>
         <p:nvSpPr>
-          <p:cNvPr id="264" name="Oval"/>
+          <p:cNvPr id="265" name="Oval"/>
           <p:cNvSpPr/>
           <p:nvPr/>
         </p:nvSpPr>
@@ -19471,7 +19540,7 @@
       </p:sp>
       <p:sp>
         <p:nvSpPr>
-          <p:cNvPr id="265" name="5"/>
+          <p:cNvPr id="266" name="5"/>
           <p:cNvSpPr txBox="1"/>
           <p:nvPr/>
         </p:nvSpPr>
@@ -19511,7 +19580,7 @@
       </p:sp>
       <p:pic>
         <p:nvPicPr>
-          <p:cNvPr id="266" name="1351844-200.png" descr="1351844-200.png"/>
+          <p:cNvPr id="267" name="1351844-200.png" descr="1351844-200.png"/>
           <p:cNvPicPr>
             <a:picLocks noChangeAspect="1"/>
           </p:cNvPicPr>
@@ -19540,7 +19609,7 @@
       </p:pic>
       <p:sp>
         <p:nvSpPr>
-          <p:cNvPr id="267" name="Oval"/>
+          <p:cNvPr id="268" name="Oval"/>
           <p:cNvSpPr/>
           <p:nvPr/>
         </p:nvSpPr>
@@ -19571,7 +19640,7 @@
       </p:sp>
       <p:sp>
         <p:nvSpPr>
-          <p:cNvPr id="268" name="3"/>
+          <p:cNvPr id="269" name="3"/>
           <p:cNvSpPr txBox="1"/>
           <p:nvPr/>
         </p:nvSpPr>
@@ -19609,7 +19678,7 @@
       </p:sp>
       <p:pic>
         <p:nvPicPr>
-          <p:cNvPr id="269" name="239207.png" descr="239207.png"/>
+          <p:cNvPr id="270" name="239207.png" descr="239207.png"/>
           <p:cNvPicPr>
             <a:picLocks noChangeAspect="1"/>
           </p:cNvPicPr>
@@ -19638,7 +19707,7 @@
       </p:pic>
       <p:pic>
         <p:nvPicPr>
-          <p:cNvPr id="270" name="Unknown.png" descr="Unknown.png"/>
+          <p:cNvPr id="271" name="Unknown.png" descr="Unknown.png"/>
           <p:cNvPicPr>
             <a:picLocks noChangeAspect="1"/>
           </p:cNvPicPr>
@@ -19667,7 +19736,7 @@
       </p:pic>
       <p:sp>
         <p:nvSpPr>
-          <p:cNvPr id="271" name="Rounded Rectangle"/>
+          <p:cNvPr id="272" name="Rounded Rectangle"/>
           <p:cNvSpPr/>
           <p:nvPr/>
         </p:nvSpPr>
@@ -19700,7 +19769,7 @@
       </p:sp>
       <p:pic>
         <p:nvPicPr>
-          <p:cNvPr id="272" name="logo.png" descr="logo.png"/>
+          <p:cNvPr id="273" name="logo.png" descr="logo.png"/>
           <p:cNvPicPr>
             <a:picLocks noChangeAspect="1"/>
           </p:cNvPicPr>
@@ -19729,7 +19798,7 @@
       </p:pic>
       <p:pic>
         <p:nvPicPr>
-          <p:cNvPr id="273" name="Unknown.png" descr="Unknown.png"/>
+          <p:cNvPr id="274" name="Unknown.png" descr="Unknown.png"/>
           <p:cNvPicPr>
             <a:picLocks noChangeAspect="1"/>
           </p:cNvPicPr>
@@ -19758,7 +19827,7 @@
       </p:pic>
       <p:sp>
         <p:nvSpPr>
-          <p:cNvPr id="274" name="Square"/>
+          <p:cNvPr id="275" name="Square"/>
           <p:cNvSpPr/>
           <p:nvPr/>
         </p:nvSpPr>
@@ -19790,7 +19859,7 @@
       </p:sp>
       <p:sp>
         <p:nvSpPr>
-          <p:cNvPr id="275" name="Rounded Rectangle"/>
+          <p:cNvPr id="276" name="Rounded Rectangle"/>
           <p:cNvSpPr/>
           <p:nvPr/>
         </p:nvSpPr>
@@ -19824,7 +19893,7 @@
       </p:sp>
       <p:sp>
         <p:nvSpPr>
-          <p:cNvPr id="276" name="Square"/>
+          <p:cNvPr id="277" name="Square"/>
           <p:cNvSpPr/>
           <p:nvPr/>
         </p:nvSpPr>
@@ -19856,7 +19925,7 @@
       </p:sp>
       <p:sp>
         <p:nvSpPr>
-          <p:cNvPr id="277" name="Circle"/>
+          <p:cNvPr id="278" name="Circle"/>
           <p:cNvSpPr/>
           <p:nvPr/>
         </p:nvSpPr>
@@ -19887,7 +19956,7 @@
       </p:sp>
       <p:sp>
         <p:nvSpPr>
-          <p:cNvPr id="278" name="Circle"/>
+          <p:cNvPr id="279" name="Circle"/>
           <p:cNvSpPr/>
           <p:nvPr/>
         </p:nvSpPr>
@@ -19918,7 +19987,7 @@
       </p:sp>
       <p:sp>
         <p:nvSpPr>
-          <p:cNvPr id="279" name="Circle"/>
+          <p:cNvPr id="280" name="Circle"/>
           <p:cNvSpPr/>
           <p:nvPr/>
         </p:nvSpPr>
@@ -19949,7 +20018,7 @@
       </p:sp>
       <p:sp>
         <p:nvSpPr>
-          <p:cNvPr id="280" name="Circle"/>
+          <p:cNvPr id="281" name="Circle"/>
           <p:cNvSpPr/>
           <p:nvPr/>
         </p:nvSpPr>
@@ -19980,7 +20049,7 @@
       </p:sp>
       <p:sp>
         <p:nvSpPr>
-          <p:cNvPr id="281" name="Circle"/>
+          <p:cNvPr id="282" name="Circle"/>
           <p:cNvSpPr/>
           <p:nvPr/>
         </p:nvSpPr>
@@ -20011,7 +20080,7 @@
       </p:sp>
       <p:sp>
         <p:nvSpPr>
-          <p:cNvPr id="282" name="Circle"/>
+          <p:cNvPr id="283" name="Circle"/>
           <p:cNvSpPr/>
           <p:nvPr/>
         </p:nvSpPr>
@@ -20042,7 +20111,7 @@
       </p:sp>
       <p:sp>
         <p:nvSpPr>
-          <p:cNvPr id="283" name="Circle"/>
+          <p:cNvPr id="284" name="Circle"/>
           <p:cNvSpPr/>
           <p:nvPr/>
         </p:nvSpPr>
@@ -20073,7 +20142,7 @@
       </p:sp>
       <p:sp>
         <p:nvSpPr>
-          <p:cNvPr id="284" name="Circle"/>
+          <p:cNvPr id="285" name="Circle"/>
           <p:cNvSpPr/>
           <p:nvPr/>
         </p:nvSpPr>
@@ -20104,7 +20173,7 @@
       </p:sp>
       <p:sp>
         <p:nvSpPr>
-          <p:cNvPr id="285" name="Shape"/>
+          <p:cNvPr id="286" name="Shape"/>
           <p:cNvSpPr/>
           <p:nvPr/>
         </p:nvSpPr>
@@ -20169,10 +20238,10 @@
       </p:sp>
       <p:cxnSp>
         <p:nvCxnSpPr>
-          <p:cNvPr id="286" name="Connection Line"/>
+          <p:cNvPr id="287" name="Connection Line"/>
           <p:cNvCxnSpPr>
-            <a:stCxn id="275" idx="0"/>
-            <a:endCxn id="281" idx="0"/>
+            <a:stCxn id="276" idx="0"/>
+            <a:endCxn id="282" idx="0"/>
           </p:cNvCxnSpPr>
           <p:nvPr/>
         </p:nvCxnSpPr>
@@ -20180,30 +20249,6 @@
           <a:xfrm>
             <a:off x="6379625" y="3351819"/>
             <a:ext cx="288956" cy="611940"/>
-          </a:xfrm>
-          <a:prstGeom prst="straightConnector1">
-            <a:avLst/>
-          </a:prstGeom>
-          <a:ln w="12700">
-            <a:solidFill>
-              <a:schemeClr val="accent1"/>
-            </a:solidFill>
-          </a:ln>
-        </p:spPr>
-      </p:cxnSp>
-      <p:cxnSp>
-        <p:nvCxnSpPr>
-          <p:cNvPr id="287" name="Connection Line"/>
-          <p:cNvCxnSpPr>
-            <a:stCxn id="275" idx="0"/>
-            <a:endCxn id="282" idx="0"/>
-          </p:cNvCxnSpPr>
-          <p:nvPr/>
-        </p:nvCxnSpPr>
-        <p:spPr>
-          <a:xfrm>
-            <a:off x="6379625" y="3351819"/>
-            <a:ext cx="1296237" cy="609308"/>
           </a:xfrm>
           <a:prstGeom prst="straightConnector1">
             <a:avLst/>
@@ -20219,15 +20264,15 @@
         <p:nvCxnSpPr>
           <p:cNvPr id="288" name="Connection Line"/>
           <p:cNvCxnSpPr>
-            <a:stCxn id="283" idx="0"/>
-            <a:endCxn id="275" idx="0"/>
+            <a:stCxn id="276" idx="0"/>
+            <a:endCxn id="283" idx="0"/>
           </p:cNvCxnSpPr>
           <p:nvPr/>
         </p:nvCxnSpPr>
         <p:spPr>
-          <a:xfrm flipH="1" flipV="1">
+          <a:xfrm>
             <a:off x="6379625" y="3351819"/>
-            <a:ext cx="806804" cy="609308"/>
+            <a:ext cx="1296237" cy="609308"/>
           </a:xfrm>
           <a:prstGeom prst="straightConnector1">
             <a:avLst/>
@@ -20243,15 +20288,15 @@
         <p:nvCxnSpPr>
           <p:cNvPr id="289" name="Connection Line"/>
           <p:cNvCxnSpPr>
-            <a:stCxn id="275" idx="0"/>
-            <a:endCxn id="284" idx="0"/>
+            <a:stCxn id="284" idx="0"/>
+            <a:endCxn id="276" idx="0"/>
           </p:cNvCxnSpPr>
           <p:nvPr/>
         </p:nvCxnSpPr>
         <p:spPr>
-          <a:xfrm>
+          <a:xfrm flipH="1" flipV="1">
             <a:off x="6379625" y="3351819"/>
-            <a:ext cx="1830105" cy="611156"/>
+            <a:ext cx="806804" cy="609308"/>
           </a:xfrm>
           <a:prstGeom prst="straightConnector1">
             <a:avLst/>
@@ -20267,15 +20312,15 @@
         <p:nvCxnSpPr>
           <p:cNvPr id="290" name="Connection Line"/>
           <p:cNvCxnSpPr>
-            <a:stCxn id="275" idx="0"/>
-            <a:endCxn id="276" idx="0"/>
+            <a:stCxn id="276" idx="0"/>
+            <a:endCxn id="285" idx="0"/>
           </p:cNvCxnSpPr>
           <p:nvPr/>
         </p:nvCxnSpPr>
         <p:spPr>
-          <a:xfrm flipH="1">
-            <a:off x="4741905" y="3351819"/>
-            <a:ext cx="1637721" cy="611940"/>
+          <a:xfrm>
+            <a:off x="6379625" y="3351819"/>
+            <a:ext cx="1830105" cy="611156"/>
           </a:xfrm>
           <a:prstGeom prst="straightConnector1">
             <a:avLst/>
@@ -20291,15 +20336,15 @@
         <p:nvCxnSpPr>
           <p:cNvPr id="291" name="Connection Line"/>
           <p:cNvCxnSpPr>
-            <a:stCxn id="275" idx="0"/>
-            <a:endCxn id="274" idx="0"/>
+            <a:stCxn id="276" idx="0"/>
+            <a:endCxn id="277" idx="0"/>
           </p:cNvCxnSpPr>
           <p:nvPr/>
         </p:nvCxnSpPr>
         <p:spPr>
           <a:xfrm flipH="1">
-            <a:off x="5941909" y="3351819"/>
-            <a:ext cx="437717" cy="611940"/>
+            <a:off x="4741905" y="3351819"/>
+            <a:ext cx="1637721" cy="611940"/>
           </a:xfrm>
           <a:prstGeom prst="straightConnector1">
             <a:avLst/>
@@ -20315,15 +20360,15 @@
         <p:nvCxnSpPr>
           <p:cNvPr id="292" name="Connection Line"/>
           <p:cNvCxnSpPr>
-            <a:stCxn id="280" idx="0"/>
-            <a:endCxn id="274" idx="0"/>
+            <a:stCxn id="276" idx="0"/>
+            <a:endCxn id="275" idx="0"/>
           </p:cNvCxnSpPr>
           <p:nvPr/>
         </p:nvCxnSpPr>
         <p:spPr>
-          <a:xfrm flipV="1">
-            <a:off x="5620372" y="3963758"/>
-            <a:ext cx="321538" cy="693404"/>
+          <a:xfrm flipH="1">
+            <a:off x="5941909" y="3351819"/>
+            <a:ext cx="437717" cy="611940"/>
           </a:xfrm>
           <a:prstGeom prst="straightConnector1">
             <a:avLst/>
@@ -20339,15 +20384,15 @@
         <p:nvCxnSpPr>
           <p:cNvPr id="293" name="Connection Line"/>
           <p:cNvCxnSpPr>
-            <a:stCxn id="279" idx="0"/>
-            <a:endCxn id="276" idx="0"/>
+            <a:stCxn id="281" idx="0"/>
+            <a:endCxn id="275" idx="0"/>
           </p:cNvCxnSpPr>
           <p:nvPr/>
         </p:nvCxnSpPr>
         <p:spPr>
           <a:xfrm flipV="1">
-            <a:off x="3850477" y="3963758"/>
-            <a:ext cx="891429" cy="680941"/>
+            <a:off x="5620372" y="3963758"/>
+            <a:ext cx="321538" cy="693404"/>
           </a:xfrm>
           <a:prstGeom prst="straightConnector1">
             <a:avLst/>
@@ -20363,15 +20408,15 @@
         <p:nvCxnSpPr>
           <p:cNvPr id="294" name="Connection Line"/>
           <p:cNvCxnSpPr>
-            <a:stCxn id="278" idx="0"/>
-            <a:endCxn id="276" idx="0"/>
+            <a:stCxn id="280" idx="0"/>
+            <a:endCxn id="277" idx="0"/>
           </p:cNvCxnSpPr>
           <p:nvPr/>
         </p:nvCxnSpPr>
         <p:spPr>
           <a:xfrm flipV="1">
-            <a:off x="4293146" y="3963758"/>
-            <a:ext cx="448760" cy="695706"/>
+            <a:off x="3850477" y="3963758"/>
+            <a:ext cx="891429" cy="680941"/>
           </a:xfrm>
           <a:prstGeom prst="straightConnector1">
             <a:avLst/>
@@ -20387,15 +20432,15 @@
         <p:nvCxnSpPr>
           <p:cNvPr id="295" name="Connection Line"/>
           <p:cNvCxnSpPr>
-            <a:stCxn id="277" idx="0"/>
-            <a:endCxn id="276" idx="0"/>
+            <a:stCxn id="279" idx="0"/>
+            <a:endCxn id="277" idx="0"/>
           </p:cNvCxnSpPr>
           <p:nvPr/>
         </p:nvCxnSpPr>
         <p:spPr>
           <a:xfrm flipV="1">
-            <a:off x="4735816" y="3963758"/>
-            <a:ext cx="6090" cy="680941"/>
+            <a:off x="4293146" y="3963758"/>
+            <a:ext cx="448760" cy="695706"/>
           </a:xfrm>
           <a:prstGeom prst="straightConnector1">
             <a:avLst/>
@@ -20411,15 +20456,15 @@
         <p:nvCxnSpPr>
           <p:cNvPr id="296" name="Connection Line"/>
           <p:cNvCxnSpPr>
-            <a:stCxn id="285" idx="0"/>
-            <a:endCxn id="284" idx="0"/>
+            <a:stCxn id="278" idx="0"/>
+            <a:endCxn id="277" idx="0"/>
           </p:cNvCxnSpPr>
           <p:nvPr/>
         </p:nvCxnSpPr>
         <p:spPr>
           <a:xfrm flipV="1">
-            <a:off x="5839535" y="3962974"/>
-            <a:ext cx="2370195" cy="1559876"/>
+            <a:off x="4735816" y="3963758"/>
+            <a:ext cx="6090" cy="680941"/>
           </a:xfrm>
           <a:prstGeom prst="straightConnector1">
             <a:avLst/>
@@ -20435,15 +20480,15 @@
         <p:nvCxnSpPr>
           <p:cNvPr id="297" name="Connection Line"/>
           <p:cNvCxnSpPr>
-            <a:stCxn id="283" idx="0"/>
+            <a:stCxn id="286" idx="0"/>
             <a:endCxn id="285" idx="0"/>
           </p:cNvCxnSpPr>
           <p:nvPr/>
         </p:nvCxnSpPr>
         <p:spPr>
-          <a:xfrm flipH="1">
-            <a:off x="5839535" y="3961126"/>
-            <a:ext cx="1346894" cy="1561724"/>
+          <a:xfrm flipV="1">
+            <a:off x="5839535" y="3962974"/>
+            <a:ext cx="2370195" cy="1559876"/>
           </a:xfrm>
           <a:prstGeom prst="straightConnector1">
             <a:avLst/>
@@ -20459,15 +20504,15 @@
         <p:nvCxnSpPr>
           <p:cNvPr id="298" name="Connection Line"/>
           <p:cNvCxnSpPr>
-            <a:stCxn id="285" idx="0"/>
-            <a:endCxn id="282" idx="0"/>
+            <a:stCxn id="284" idx="0"/>
+            <a:endCxn id="286" idx="0"/>
           </p:cNvCxnSpPr>
           <p:nvPr/>
         </p:nvCxnSpPr>
         <p:spPr>
-          <a:xfrm flipV="1">
+          <a:xfrm flipH="1">
             <a:off x="5839535" y="3961126"/>
-            <a:ext cx="1836327" cy="1561724"/>
+            <a:ext cx="1346894" cy="1561724"/>
           </a:xfrm>
           <a:prstGeom prst="straightConnector1">
             <a:avLst/>
@@ -20483,15 +20528,15 @@
         <p:nvCxnSpPr>
           <p:cNvPr id="299" name="Connection Line"/>
           <p:cNvCxnSpPr>
-            <a:stCxn id="285" idx="0"/>
-            <a:endCxn id="281" idx="0"/>
+            <a:stCxn id="286" idx="0"/>
+            <a:endCxn id="283" idx="0"/>
           </p:cNvCxnSpPr>
           <p:nvPr/>
         </p:nvCxnSpPr>
         <p:spPr>
           <a:xfrm flipV="1">
-            <a:off x="5839535" y="3963758"/>
-            <a:ext cx="829046" cy="1559092"/>
+            <a:off x="5839535" y="3961126"/>
+            <a:ext cx="1836327" cy="1561724"/>
           </a:xfrm>
           <a:prstGeom prst="straightConnector1">
             <a:avLst/>
@@ -20507,15 +20552,15 @@
         <p:nvCxnSpPr>
           <p:cNvPr id="300" name="Connection Line"/>
           <p:cNvCxnSpPr>
-            <a:stCxn id="285" idx="0"/>
-            <a:endCxn id="275" idx="0"/>
+            <a:stCxn id="286" idx="0"/>
+            <a:endCxn id="282" idx="0"/>
           </p:cNvCxnSpPr>
           <p:nvPr/>
         </p:nvCxnSpPr>
         <p:spPr>
           <a:xfrm flipV="1">
-            <a:off x="5839535" y="3351819"/>
-            <a:ext cx="540091" cy="2171031"/>
+            <a:off x="5839535" y="3963758"/>
+            <a:ext cx="829046" cy="1559092"/>
           </a:xfrm>
           <a:prstGeom prst="straightConnector1">
             <a:avLst/>
@@ -20531,15 +20576,15 @@
         <p:nvCxnSpPr>
           <p:cNvPr id="301" name="Connection Line"/>
           <p:cNvCxnSpPr>
-            <a:stCxn id="277" idx="0"/>
-            <a:endCxn id="285" idx="0"/>
+            <a:stCxn id="286" idx="0"/>
+            <a:endCxn id="276" idx="0"/>
           </p:cNvCxnSpPr>
           <p:nvPr/>
         </p:nvCxnSpPr>
         <p:spPr>
-          <a:xfrm>
-            <a:off x="4735816" y="4644698"/>
-            <a:ext cx="1103720" cy="878152"/>
+          <a:xfrm flipV="1">
+            <a:off x="5839535" y="3351819"/>
+            <a:ext cx="540091" cy="2171031"/>
           </a:xfrm>
           <a:prstGeom prst="straightConnector1">
             <a:avLst/>
@@ -20555,15 +20600,15 @@
         <p:nvCxnSpPr>
           <p:cNvPr id="302" name="Connection Line"/>
           <p:cNvCxnSpPr>
-            <a:stCxn id="285" idx="0"/>
-            <a:endCxn id="278" idx="0"/>
+            <a:stCxn id="278" idx="0"/>
+            <a:endCxn id="286" idx="0"/>
           </p:cNvCxnSpPr>
           <p:nvPr/>
         </p:nvCxnSpPr>
         <p:spPr>
-          <a:xfrm flipH="1" flipV="1">
-            <a:off x="4293146" y="4659463"/>
-            <a:ext cx="1546390" cy="863387"/>
+          <a:xfrm>
+            <a:off x="4735816" y="4644698"/>
+            <a:ext cx="1103720" cy="878152"/>
           </a:xfrm>
           <a:prstGeom prst="straightConnector1">
             <a:avLst/>
@@ -20579,15 +20624,15 @@
         <p:nvCxnSpPr>
           <p:cNvPr id="303" name="Connection Line"/>
           <p:cNvCxnSpPr>
-            <a:stCxn id="279" idx="0"/>
-            <a:endCxn id="285" idx="0"/>
+            <a:stCxn id="286" idx="0"/>
+            <a:endCxn id="279" idx="0"/>
           </p:cNvCxnSpPr>
           <p:nvPr/>
         </p:nvCxnSpPr>
         <p:spPr>
-          <a:xfrm>
-            <a:off x="3850477" y="4644698"/>
-            <a:ext cx="1989059" cy="878152"/>
+          <a:xfrm flipH="1" flipV="1">
+            <a:off x="4293146" y="4659463"/>
+            <a:ext cx="1546390" cy="863387"/>
           </a:xfrm>
           <a:prstGeom prst="straightConnector1">
             <a:avLst/>
@@ -20603,15 +20648,15 @@
         <p:nvCxnSpPr>
           <p:cNvPr id="304" name="Connection Line"/>
           <p:cNvCxnSpPr>
-            <a:stCxn id="285" idx="0"/>
-            <a:endCxn id="280" idx="0"/>
+            <a:stCxn id="280" idx="0"/>
+            <a:endCxn id="286" idx="0"/>
           </p:cNvCxnSpPr>
           <p:nvPr/>
         </p:nvCxnSpPr>
         <p:spPr>
-          <a:xfrm flipH="1" flipV="1">
-            <a:off x="5620372" y="4657161"/>
-            <a:ext cx="219164" cy="865689"/>
+          <a:xfrm>
+            <a:off x="3850477" y="4644698"/>
+            <a:ext cx="1989059" cy="878152"/>
           </a:xfrm>
           <a:prstGeom prst="straightConnector1">
             <a:avLst/>
@@ -20627,15 +20672,15 @@
         <p:nvCxnSpPr>
           <p:cNvPr id="305" name="Connection Line"/>
           <p:cNvCxnSpPr>
-            <a:stCxn id="276" idx="0"/>
-            <a:endCxn id="285" idx="0"/>
+            <a:stCxn id="286" idx="0"/>
+            <a:endCxn id="281" idx="0"/>
           </p:cNvCxnSpPr>
           <p:nvPr/>
         </p:nvCxnSpPr>
         <p:spPr>
-          <a:xfrm>
-            <a:off x="4741905" y="3963758"/>
-            <a:ext cx="1097631" cy="1559092"/>
+          <a:xfrm flipH="1" flipV="1">
+            <a:off x="5620372" y="4657161"/>
+            <a:ext cx="219164" cy="865689"/>
           </a:xfrm>
           <a:prstGeom prst="straightConnector1">
             <a:avLst/>
@@ -20651,8 +20696,32 @@
         <p:nvCxnSpPr>
           <p:cNvPr id="306" name="Connection Line"/>
           <p:cNvCxnSpPr>
-            <a:stCxn id="274" idx="0"/>
-            <a:endCxn id="285" idx="0"/>
+            <a:stCxn id="277" idx="0"/>
+            <a:endCxn id="286" idx="0"/>
+          </p:cNvCxnSpPr>
+          <p:nvPr/>
+        </p:nvCxnSpPr>
+        <p:spPr>
+          <a:xfrm>
+            <a:off x="4741905" y="3963758"/>
+            <a:ext cx="1097631" cy="1559092"/>
+          </a:xfrm>
+          <a:prstGeom prst="straightConnector1">
+            <a:avLst/>
+          </a:prstGeom>
+          <a:ln w="12700">
+            <a:solidFill>
+              <a:schemeClr val="accent1"/>
+            </a:solidFill>
+          </a:ln>
+        </p:spPr>
+      </p:cxnSp>
+      <p:cxnSp>
+        <p:nvCxnSpPr>
+          <p:cNvPr id="307" name="Connection Line"/>
+          <p:cNvCxnSpPr>
+            <a:stCxn id="275" idx="0"/>
+            <a:endCxn id="286" idx="0"/>
           </p:cNvCxnSpPr>
           <p:nvPr/>
         </p:nvCxnSpPr>
@@ -20673,7 +20742,7 @@
       </p:cxnSp>
       <p:pic>
         <p:nvPicPr>
-          <p:cNvPr id="307" name="3621249.png" descr="3621249.png"/>
+          <p:cNvPr id="308" name="3621249.png" descr="3621249.png"/>
           <p:cNvPicPr>
             <a:picLocks noChangeAspect="1"/>
           </p:cNvPicPr>
@@ -20702,7 +20771,7 @@
       </p:pic>
       <p:sp>
         <p:nvSpPr>
-          <p:cNvPr id="308" name="Oval"/>
+          <p:cNvPr id="309" name="Oval"/>
           <p:cNvSpPr/>
           <p:nvPr/>
         </p:nvSpPr>
@@ -20733,7 +20802,7 @@
       </p:sp>
       <p:sp>
         <p:nvSpPr>
-          <p:cNvPr id="309" name="6"/>
+          <p:cNvPr id="310" name="6"/>
           <p:cNvSpPr txBox="1"/>
           <p:nvPr/>
         </p:nvSpPr>
@@ -20771,7 +20840,7 @@
       </p:sp>
       <p:sp>
         <p:nvSpPr>
-          <p:cNvPr id="310" name="Line"/>
+          <p:cNvPr id="311" name="Line"/>
           <p:cNvSpPr/>
           <p:nvPr/>
         </p:nvSpPr>
@@ -20804,7 +20873,7 @@
       </p:sp>
       <p:pic>
         <p:nvPicPr>
-          <p:cNvPr id="311" name="102642.png" descr="102642.png"/>
+          <p:cNvPr id="312" name="102642.png" descr="102642.png"/>
           <p:cNvPicPr>
             <a:picLocks noChangeAspect="1"/>
           </p:cNvPicPr>
@@ -20833,7 +20902,7 @@
       </p:pic>
       <p:pic>
         <p:nvPicPr>
-          <p:cNvPr id="312" name="239207.png" descr="239207.png"/>
+          <p:cNvPr id="313" name="239207.png" descr="239207.png"/>
           <p:cNvPicPr>
             <a:picLocks noChangeAspect="1"/>
           </p:cNvPicPr>
@@ -20862,7 +20931,7 @@
       </p:pic>
       <p:sp>
         <p:nvSpPr>
-          <p:cNvPr id="313" name="Oval"/>
+          <p:cNvPr id="314" name="Oval"/>
           <p:cNvSpPr/>
           <p:nvPr/>
         </p:nvSpPr>
@@ -20893,7 +20962,7 @@
       </p:sp>
       <p:sp>
         <p:nvSpPr>
-          <p:cNvPr id="314" name="2"/>
+          <p:cNvPr id="315" name="2"/>
           <p:cNvSpPr txBox="1"/>
           <p:nvPr/>
         </p:nvSpPr>
@@ -20931,7 +21000,7 @@
       </p:sp>
       <p:pic>
         <p:nvPicPr>
-          <p:cNvPr id="315" name="Screenshot 2024-01-21 at 16.09.34.png" descr="Screenshot 2024-01-21 at 16.09.34.png"/>
+          <p:cNvPr id="316" name="Screenshot 2024-01-21 at 16.09.34.png" descr="Screenshot 2024-01-21 at 16.09.34.png"/>
           <p:cNvPicPr>
             <a:picLocks noChangeAspect="1"/>
           </p:cNvPicPr>
@@ -20960,7 +21029,7 @@
       </p:pic>
       <p:sp>
         <p:nvSpPr>
-          <p:cNvPr id="316" name="Line"/>
+          <p:cNvPr id="317" name="Line"/>
           <p:cNvSpPr/>
           <p:nvPr/>
         </p:nvSpPr>
@@ -20989,7 +21058,7 @@
       </p:sp>
       <p:sp>
         <p:nvSpPr>
-          <p:cNvPr id="317" name="Java…"/>
+          <p:cNvPr id="318" name="Java…"/>
           <p:cNvSpPr txBox="1"/>
           <p:nvPr/>
         </p:nvSpPr>
@@ -21029,7 +21098,7 @@
       </p:sp>
       <p:sp>
         <p:nvSpPr>
-          <p:cNvPr id="318" name="Line"/>
+          <p:cNvPr id="319" name="Line"/>
           <p:cNvSpPr/>
           <p:nvPr/>
         </p:nvSpPr>
@@ -21062,7 +21131,7 @@
       </p:sp>
       <p:sp>
         <p:nvSpPr>
-          <p:cNvPr id="319" name="Java…"/>
+          <p:cNvPr id="320" name="Java…"/>
           <p:cNvSpPr txBox="1"/>
           <p:nvPr/>
         </p:nvSpPr>
@@ -21102,7 +21171,7 @@
       </p:sp>
       <p:sp>
         <p:nvSpPr>
-          <p:cNvPr id="320" name="Line"/>
+          <p:cNvPr id="321" name="Line"/>
           <p:cNvSpPr/>
           <p:nvPr/>
         </p:nvSpPr>
@@ -21135,7 +21204,7 @@
       </p:sp>
       <p:sp>
         <p:nvSpPr>
-          <p:cNvPr id="321" name="Line"/>
+          <p:cNvPr id="322" name="Line"/>
           <p:cNvSpPr/>
           <p:nvPr/>
         </p:nvSpPr>
@@ -21168,7 +21237,7 @@
       </p:sp>
       <p:pic>
         <p:nvPicPr>
-          <p:cNvPr id="322" name="Data_Cleaning-512.png" descr="Data_Cleaning-512.png"/>
+          <p:cNvPr id="323" name="Data_Cleaning-512.png" descr="Data_Cleaning-512.png"/>
           <p:cNvPicPr>
             <a:picLocks noChangeAspect="1"/>
           </p:cNvPicPr>
@@ -21198,7 +21267,7 @@
       </p:pic>
       <p:sp>
         <p:nvSpPr>
-          <p:cNvPr id="323" name="Line"/>
+          <p:cNvPr id="324" name="Line"/>
           <p:cNvSpPr/>
           <p:nvPr/>
         </p:nvSpPr>
@@ -21231,7 +21300,7 @@
       </p:sp>
       <p:sp>
         <p:nvSpPr>
-          <p:cNvPr id="324" name="Oval"/>
+          <p:cNvPr id="325" name="Oval"/>
           <p:cNvSpPr/>
           <p:nvPr/>
         </p:nvSpPr>
@@ -21262,7 +21331,7 @@
       </p:sp>
       <p:sp>
         <p:nvSpPr>
-          <p:cNvPr id="325" name="7"/>
+          <p:cNvPr id="326" name="7"/>
           <p:cNvSpPr txBox="1"/>
           <p:nvPr/>
         </p:nvSpPr>
@@ -21300,7 +21369,7 @@
       </p:sp>
       <p:sp>
         <p:nvSpPr>
-          <p:cNvPr id="326" name="Line"/>
+          <p:cNvPr id="327" name="Line"/>
           <p:cNvSpPr/>
           <p:nvPr/>
         </p:nvSpPr>
@@ -21329,7 +21398,7 @@
       </p:sp>
       <p:sp>
         <p:nvSpPr>
-          <p:cNvPr id="327" name="Java…"/>
+          <p:cNvPr id="328" name="Java…"/>
           <p:cNvSpPr txBox="1"/>
           <p:nvPr/>
         </p:nvSpPr>
@@ -21372,7 +21441,7 @@
       </p:sp>
       <p:sp>
         <p:nvSpPr>
-          <p:cNvPr id="328" name="Line"/>
+          <p:cNvPr id="329" name="Line"/>
           <p:cNvSpPr/>
           <p:nvPr/>
         </p:nvSpPr>
@@ -21405,7 +21474,7 @@
       </p:sp>
       <p:sp>
         <p:nvSpPr>
-          <p:cNvPr id="329" name="Line"/>
+          <p:cNvPr id="330" name="Line"/>
           <p:cNvSpPr/>
           <p:nvPr/>
         </p:nvSpPr>
@@ -21438,7 +21507,7 @@
       </p:sp>
       <p:sp>
         <p:nvSpPr>
-          <p:cNvPr id="330" name="Oval"/>
+          <p:cNvPr id="331" name="Oval"/>
           <p:cNvSpPr/>
           <p:nvPr/>
         </p:nvSpPr>
@@ -21469,7 +21538,7 @@
       </p:sp>
       <p:sp>
         <p:nvSpPr>
-          <p:cNvPr id="331" name="1"/>
+          <p:cNvPr id="332" name="1"/>
           <p:cNvSpPr txBox="1"/>
           <p:nvPr/>
         </p:nvSpPr>
@@ -21507,7 +21576,7 @@
       </p:sp>
       <p:sp>
         <p:nvSpPr>
-          <p:cNvPr id="332" name="Java…"/>
+          <p:cNvPr id="333" name="Java…"/>
           <p:cNvSpPr txBox="1"/>
           <p:nvPr/>
         </p:nvSpPr>
@@ -21547,7 +21616,7 @@
       </p:sp>
       <p:sp>
         <p:nvSpPr>
-          <p:cNvPr id="333" name="Java…"/>
+          <p:cNvPr id="334" name="Java…"/>
           <p:cNvSpPr txBox="1"/>
           <p:nvPr/>
         </p:nvSpPr>
@@ -21587,7 +21656,7 @@
       </p:sp>
       <p:sp>
         <p:nvSpPr>
-          <p:cNvPr id="334" name="Java…"/>
+          <p:cNvPr id="335" name="Java…"/>
           <p:cNvSpPr txBox="1"/>
           <p:nvPr/>
         </p:nvSpPr>
@@ -21627,7 +21696,7 @@
       </p:sp>
       <p:sp>
         <p:nvSpPr>
-          <p:cNvPr id="335" name="Java…"/>
+          <p:cNvPr id="336" name="Java…"/>
           <p:cNvSpPr txBox="1"/>
           <p:nvPr/>
         </p:nvSpPr>
@@ -21667,7 +21736,7 @@
       </p:sp>
       <p:sp>
         <p:nvSpPr>
-          <p:cNvPr id="336" name="Java…"/>
+          <p:cNvPr id="337" name="Java…"/>
           <p:cNvSpPr txBox="1"/>
           <p:nvPr/>
         </p:nvSpPr>
@@ -21707,7 +21776,7 @@
       </p:sp>
       <p:sp>
         <p:nvSpPr>
-          <p:cNvPr id="337" name="Execution Steps (Repeated) of the Testbed"/>
+          <p:cNvPr id="338" name="Execution Steps (Repeated) of the Testbed"/>
           <p:cNvSpPr txBox="1"/>
           <p:nvPr>
             <p:ph type="title"/>
@@ -21735,7 +21804,7 @@
       </p:sp>
       <p:pic>
         <p:nvPicPr>
-          <p:cNvPr id="338" name="Unknown.png" descr="Unknown.png"/>
+          <p:cNvPr id="339" name="Unknown.png" descr="Unknown.png"/>
           <p:cNvPicPr>
             <a:picLocks noChangeAspect="1"/>
           </p:cNvPicPr>
@@ -21764,7 +21833,7 @@
       </p:pic>
       <p:sp>
         <p:nvSpPr>
-          <p:cNvPr id="339" name="Date Placeholder 3"/>
+          <p:cNvPr id="340" name="Date Placeholder 3"/>
           <p:cNvSpPr txBox="1"/>
           <p:nvPr/>
         </p:nvSpPr>
@@ -21808,7 +21877,7 @@
       </p:sp>
       <p:sp>
         <p:nvSpPr>
-          <p:cNvPr id="340" name="Footer Placeholder 4"/>
+          <p:cNvPr id="341" name="Footer Placeholder 4"/>
           <p:cNvSpPr txBox="1"/>
           <p:nvPr/>
         </p:nvSpPr>
@@ -21850,7 +21919,7 @@
       </p:sp>
       <p:sp>
         <p:nvSpPr>
-          <p:cNvPr id="341" name="Slide Number"/>
+          <p:cNvPr id="342" name="Slide Number"/>
           <p:cNvSpPr txBox="1"/>
           <p:nvPr>
             <p:ph type="sldNum" sz="quarter" idx="4294967295"/>
@@ -21907,7 +21976,7 @@
       </p:grpSpPr>
       <p:sp>
         <p:nvSpPr>
-          <p:cNvPr id="343" name="Configuring the Components of the P2P Algorithm"/>
+          <p:cNvPr id="344" name="Configuring the Components of the P2P Algorithm"/>
           <p:cNvSpPr txBox="1"/>
           <p:nvPr>
             <p:ph type="title"/>
@@ -21935,7 +22004,7 @@
       </p:sp>
       <p:sp>
         <p:nvSpPr>
-          <p:cNvPr id="344" name="Slide Number"/>
+          <p:cNvPr id="345" name="Slide Number"/>
           <p:cNvSpPr txBox="1"/>
           <p:nvPr>
             <p:ph type="sldNum" sz="quarter" idx="4294967295"/>
@@ -21966,7 +22035,7 @@
       </p:sp>
       <p:sp>
         <p:nvSpPr>
-          <p:cNvPr id="345" name="Date Placeholder 3"/>
+          <p:cNvPr id="346" name="Date Placeholder 3"/>
           <p:cNvSpPr txBox="1"/>
           <p:nvPr/>
         </p:nvSpPr>
@@ -22010,7 +22079,7 @@
       </p:sp>
       <p:sp>
         <p:nvSpPr>
-          <p:cNvPr id="346" name="Footer Placeholder 4"/>
+          <p:cNvPr id="347" name="Footer Placeholder 4"/>
           <p:cNvSpPr txBox="1"/>
           <p:nvPr/>
         </p:nvSpPr>
@@ -22052,7 +22121,7 @@
       </p:sp>
       <p:sp>
         <p:nvSpPr>
-          <p:cNvPr id="347" name="name: p2p-network-topology…"/>
+          <p:cNvPr id="348" name="name: p2p-network-topology…"/>
           <p:cNvSpPr txBox="1"/>
           <p:nvPr/>
         </p:nvSpPr>
@@ -22968,7 +23037,7 @@
       </p:sp>
       <p:sp>
         <p:nvSpPr>
-          <p:cNvPr id="348" name="Configuration of Containerlab File"/>
+          <p:cNvPr id="349" name="Configuration of Containerlab File"/>
           <p:cNvSpPr txBox="1"/>
           <p:nvPr/>
         </p:nvSpPr>
@@ -23022,7 +23091,7 @@
       </p:sp>
       <p:pic>
         <p:nvPicPr>
-          <p:cNvPr id="349" name="yaml-file-format-line-icon-free-vector.jpg" descr="yaml-file-format-line-icon-free-vector.jpg"/>
+          <p:cNvPr id="350" name="yaml-file-format-line-icon-free-vector.jpg" descr="yaml-file-format-line-icon-free-vector.jpg"/>
           <p:cNvPicPr>
             <a:picLocks noChangeAspect="1"/>
           </p:cNvPicPr>
@@ -23051,7 +23120,7 @@
       </p:pic>
       <p:sp>
         <p:nvSpPr>
-          <p:cNvPr id="350" name="Rounded Rectangle"/>
+          <p:cNvPr id="351" name="Rounded Rectangle"/>
           <p:cNvSpPr/>
           <p:nvPr/>
         </p:nvSpPr>
@@ -23085,7 +23154,7 @@
       </p:sp>
       <p:sp>
         <p:nvSpPr>
-          <p:cNvPr id="351" name="Square"/>
+          <p:cNvPr id="352" name="Square"/>
           <p:cNvSpPr/>
           <p:nvPr/>
         </p:nvSpPr>
@@ -23117,7 +23186,7 @@
       </p:sp>
       <p:sp>
         <p:nvSpPr>
-          <p:cNvPr id="352" name="Circle"/>
+          <p:cNvPr id="353" name="Circle"/>
           <p:cNvSpPr/>
           <p:nvPr/>
         </p:nvSpPr>
@@ -23148,7 +23217,7 @@
       </p:sp>
       <p:sp>
         <p:nvSpPr>
-          <p:cNvPr id="353" name="Shape"/>
+          <p:cNvPr id="354" name="Shape"/>
           <p:cNvSpPr/>
           <p:nvPr/>
         </p:nvSpPr>
@@ -23213,7 +23282,7 @@
       </p:sp>
       <p:sp>
         <p:nvSpPr>
-          <p:cNvPr id="354" name="Java…"/>
+          <p:cNvPr id="355" name="Java…"/>
           <p:cNvSpPr txBox="1"/>
           <p:nvPr/>
         </p:nvSpPr>
@@ -23253,7 +23322,7 @@
       </p:sp>
       <p:sp>
         <p:nvSpPr>
-          <p:cNvPr id="355" name="Square"/>
+          <p:cNvPr id="356" name="Square"/>
           <p:cNvSpPr/>
           <p:nvPr/>
         </p:nvSpPr>
@@ -23285,7 +23354,7 @@
       </p:sp>
       <p:sp>
         <p:nvSpPr>
-          <p:cNvPr id="356" name="Rounded Rectangle"/>
+          <p:cNvPr id="357" name="Rounded Rectangle"/>
           <p:cNvSpPr/>
           <p:nvPr/>
         </p:nvSpPr>
@@ -23319,7 +23388,7 @@
       </p:sp>
       <p:sp>
         <p:nvSpPr>
-          <p:cNvPr id="357" name="Square"/>
+          <p:cNvPr id="358" name="Square"/>
           <p:cNvSpPr/>
           <p:nvPr/>
         </p:nvSpPr>
@@ -23351,7 +23420,7 @@
       </p:sp>
       <p:sp>
         <p:nvSpPr>
-          <p:cNvPr id="358" name="Circle"/>
+          <p:cNvPr id="359" name="Circle"/>
           <p:cNvSpPr/>
           <p:nvPr/>
         </p:nvSpPr>
@@ -23382,7 +23451,7 @@
       </p:sp>
       <p:sp>
         <p:nvSpPr>
-          <p:cNvPr id="359" name="Circle"/>
+          <p:cNvPr id="360" name="Circle"/>
           <p:cNvSpPr/>
           <p:nvPr/>
         </p:nvSpPr>
@@ -23413,7 +23482,7 @@
       </p:sp>
       <p:sp>
         <p:nvSpPr>
-          <p:cNvPr id="360" name="Circle"/>
+          <p:cNvPr id="361" name="Circle"/>
           <p:cNvSpPr/>
           <p:nvPr/>
         </p:nvSpPr>
@@ -23444,7 +23513,7 @@
       </p:sp>
       <p:sp>
         <p:nvSpPr>
-          <p:cNvPr id="361" name="Circle"/>
+          <p:cNvPr id="362" name="Circle"/>
           <p:cNvSpPr/>
           <p:nvPr/>
         </p:nvSpPr>
@@ -23475,7 +23544,7 @@
       </p:sp>
       <p:sp>
         <p:nvSpPr>
-          <p:cNvPr id="362" name="Circle"/>
+          <p:cNvPr id="363" name="Circle"/>
           <p:cNvSpPr/>
           <p:nvPr/>
         </p:nvSpPr>
@@ -23506,7 +23575,7 @@
       </p:sp>
       <p:sp>
         <p:nvSpPr>
-          <p:cNvPr id="363" name="Circle"/>
+          <p:cNvPr id="364" name="Circle"/>
           <p:cNvSpPr/>
           <p:nvPr/>
         </p:nvSpPr>
@@ -23537,7 +23606,7 @@
       </p:sp>
       <p:sp>
         <p:nvSpPr>
-          <p:cNvPr id="364" name="Circle"/>
+          <p:cNvPr id="365" name="Circle"/>
           <p:cNvSpPr/>
           <p:nvPr/>
         </p:nvSpPr>
@@ -23568,7 +23637,7 @@
       </p:sp>
       <p:sp>
         <p:nvSpPr>
-          <p:cNvPr id="365" name="Circle"/>
+          <p:cNvPr id="366" name="Circle"/>
           <p:cNvSpPr/>
           <p:nvPr/>
         </p:nvSpPr>
@@ -23599,7 +23668,7 @@
       </p:sp>
       <p:sp>
         <p:nvSpPr>
-          <p:cNvPr id="366" name="Shape"/>
+          <p:cNvPr id="367" name="Shape"/>
           <p:cNvSpPr/>
           <p:nvPr/>
         </p:nvSpPr>
@@ -23664,10 +23733,10 @@
       </p:sp>
       <p:cxnSp>
         <p:nvCxnSpPr>
-          <p:cNvPr id="367" name="Connection Line"/>
+          <p:cNvPr id="368" name="Connection Line"/>
           <p:cNvCxnSpPr>
-            <a:stCxn id="356" idx="0"/>
-            <a:endCxn id="362" idx="0"/>
+            <a:stCxn id="357" idx="0"/>
+            <a:endCxn id="363" idx="0"/>
           </p:cNvCxnSpPr>
           <p:nvPr/>
         </p:nvCxnSpPr>
@@ -23675,30 +23744,6 @@
           <a:xfrm>
             <a:off x="9090651" y="2459347"/>
             <a:ext cx="225456" cy="815140"/>
-          </a:xfrm>
-          <a:prstGeom prst="straightConnector1">
-            <a:avLst/>
-          </a:prstGeom>
-          <a:ln w="12700">
-            <a:solidFill>
-              <a:schemeClr val="accent1"/>
-            </a:solidFill>
-          </a:ln>
-        </p:spPr>
-      </p:cxnSp>
-      <p:cxnSp>
-        <p:nvCxnSpPr>
-          <p:cNvPr id="368" name="Connection Line"/>
-          <p:cNvCxnSpPr>
-            <a:stCxn id="356" idx="0"/>
-            <a:endCxn id="363" idx="0"/>
-          </p:cNvCxnSpPr>
-          <p:nvPr/>
-        </p:nvCxnSpPr>
-        <p:spPr>
-          <a:xfrm>
-            <a:off x="9090651" y="2459347"/>
-            <a:ext cx="1232737" cy="812508"/>
           </a:xfrm>
           <a:prstGeom prst="straightConnector1">
             <a:avLst/>
@@ -23714,15 +23759,15 @@
         <p:nvCxnSpPr>
           <p:cNvPr id="369" name="Connection Line"/>
           <p:cNvCxnSpPr>
-            <a:stCxn id="364" idx="0"/>
-            <a:endCxn id="356" idx="0"/>
+            <a:stCxn id="357" idx="0"/>
+            <a:endCxn id="364" idx="0"/>
           </p:cNvCxnSpPr>
           <p:nvPr/>
         </p:nvCxnSpPr>
         <p:spPr>
-          <a:xfrm flipH="1" flipV="1">
+          <a:xfrm>
             <a:off x="9090651" y="2459347"/>
-            <a:ext cx="743304" cy="812508"/>
+            <a:ext cx="1232737" cy="812508"/>
           </a:xfrm>
           <a:prstGeom prst="straightConnector1">
             <a:avLst/>
@@ -23738,15 +23783,15 @@
         <p:nvCxnSpPr>
           <p:cNvPr id="370" name="Connection Line"/>
           <p:cNvCxnSpPr>
-            <a:stCxn id="356" idx="0"/>
-            <a:endCxn id="365" idx="0"/>
+            <a:stCxn id="365" idx="0"/>
+            <a:endCxn id="357" idx="0"/>
           </p:cNvCxnSpPr>
           <p:nvPr/>
         </p:nvCxnSpPr>
         <p:spPr>
-          <a:xfrm>
+          <a:xfrm flipH="1" flipV="1">
             <a:off x="9090651" y="2459347"/>
-            <a:ext cx="1766605" cy="814356"/>
+            <a:ext cx="743304" cy="812508"/>
           </a:xfrm>
           <a:prstGeom prst="straightConnector1">
             <a:avLst/>
@@ -23762,15 +23807,15 @@
         <p:nvCxnSpPr>
           <p:cNvPr id="371" name="Connection Line"/>
           <p:cNvCxnSpPr>
-            <a:stCxn id="356" idx="0"/>
-            <a:endCxn id="357" idx="0"/>
+            <a:stCxn id="357" idx="0"/>
+            <a:endCxn id="366" idx="0"/>
           </p:cNvCxnSpPr>
           <p:nvPr/>
         </p:nvCxnSpPr>
         <p:spPr>
-          <a:xfrm flipH="1">
-            <a:off x="7389431" y="2459347"/>
-            <a:ext cx="1701221" cy="815140"/>
+          <a:xfrm>
+            <a:off x="9090651" y="2459347"/>
+            <a:ext cx="1766605" cy="814356"/>
           </a:xfrm>
           <a:prstGeom prst="straightConnector1">
             <a:avLst/>
@@ -23786,15 +23831,15 @@
         <p:nvCxnSpPr>
           <p:cNvPr id="372" name="Connection Line"/>
           <p:cNvCxnSpPr>
-            <a:stCxn id="356" idx="0"/>
-            <a:endCxn id="355" idx="0"/>
+            <a:stCxn id="357" idx="0"/>
+            <a:endCxn id="358" idx="0"/>
           </p:cNvCxnSpPr>
           <p:nvPr/>
         </p:nvCxnSpPr>
         <p:spPr>
           <a:xfrm flipH="1">
-            <a:off x="8589436" y="2459347"/>
-            <a:ext cx="501216" cy="815140"/>
+            <a:off x="7389431" y="2459347"/>
+            <a:ext cx="1701221" cy="815140"/>
           </a:xfrm>
           <a:prstGeom prst="straightConnector1">
             <a:avLst/>
@@ -23810,15 +23855,15 @@
         <p:nvCxnSpPr>
           <p:cNvPr id="373" name="Connection Line"/>
           <p:cNvCxnSpPr>
-            <a:stCxn id="361" idx="0"/>
-            <a:endCxn id="355" idx="0"/>
+            <a:stCxn id="357" idx="0"/>
+            <a:endCxn id="356" idx="0"/>
           </p:cNvCxnSpPr>
           <p:nvPr/>
         </p:nvCxnSpPr>
         <p:spPr>
-          <a:xfrm flipV="1">
-            <a:off x="8267899" y="3274486"/>
-            <a:ext cx="321538" cy="693404"/>
+          <a:xfrm flipH="1">
+            <a:off x="8589436" y="2459347"/>
+            <a:ext cx="501216" cy="815140"/>
           </a:xfrm>
           <a:prstGeom prst="straightConnector1">
             <a:avLst/>
@@ -23834,15 +23879,15 @@
         <p:nvCxnSpPr>
           <p:cNvPr id="374" name="Connection Line"/>
           <p:cNvCxnSpPr>
-            <a:stCxn id="360" idx="0"/>
-            <a:endCxn id="357" idx="0"/>
+            <a:stCxn id="362" idx="0"/>
+            <a:endCxn id="356" idx="0"/>
           </p:cNvCxnSpPr>
           <p:nvPr/>
         </p:nvCxnSpPr>
         <p:spPr>
           <a:xfrm flipV="1">
-            <a:off x="6498003" y="3274486"/>
-            <a:ext cx="891429" cy="680941"/>
+            <a:off x="8267899" y="3274486"/>
+            <a:ext cx="321538" cy="693404"/>
           </a:xfrm>
           <a:prstGeom prst="straightConnector1">
             <a:avLst/>
@@ -23858,15 +23903,15 @@
         <p:nvCxnSpPr>
           <p:cNvPr id="375" name="Connection Line"/>
           <p:cNvCxnSpPr>
-            <a:stCxn id="359" idx="0"/>
-            <a:endCxn id="357" idx="0"/>
+            <a:stCxn id="361" idx="0"/>
+            <a:endCxn id="358" idx="0"/>
           </p:cNvCxnSpPr>
           <p:nvPr/>
         </p:nvCxnSpPr>
         <p:spPr>
           <a:xfrm flipV="1">
-            <a:off x="6940673" y="3274486"/>
-            <a:ext cx="448759" cy="695706"/>
+            <a:off x="6498003" y="3274486"/>
+            <a:ext cx="891429" cy="680941"/>
           </a:xfrm>
           <a:prstGeom prst="straightConnector1">
             <a:avLst/>
@@ -23882,15 +23927,15 @@
         <p:nvCxnSpPr>
           <p:cNvPr id="376" name="Connection Line"/>
           <p:cNvCxnSpPr>
-            <a:stCxn id="358" idx="0"/>
-            <a:endCxn id="357" idx="0"/>
+            <a:stCxn id="360" idx="0"/>
+            <a:endCxn id="358" idx="0"/>
           </p:cNvCxnSpPr>
           <p:nvPr/>
         </p:nvCxnSpPr>
         <p:spPr>
           <a:xfrm flipV="1">
-            <a:off x="7383343" y="3274486"/>
-            <a:ext cx="6089" cy="680941"/>
+            <a:off x="6940673" y="3274486"/>
+            <a:ext cx="448759" cy="695706"/>
           </a:xfrm>
           <a:prstGeom prst="straightConnector1">
             <a:avLst/>
@@ -23906,15 +23951,15 @@
         <p:nvCxnSpPr>
           <p:cNvPr id="377" name="Connection Line"/>
           <p:cNvCxnSpPr>
-            <a:stCxn id="366" idx="0"/>
-            <a:endCxn id="365" idx="0"/>
+            <a:stCxn id="359" idx="0"/>
+            <a:endCxn id="358" idx="0"/>
           </p:cNvCxnSpPr>
           <p:nvPr/>
         </p:nvCxnSpPr>
         <p:spPr>
           <a:xfrm flipV="1">
-            <a:off x="8487061" y="3273702"/>
-            <a:ext cx="2370195" cy="1559876"/>
+            <a:off x="7383343" y="3274486"/>
+            <a:ext cx="6089" cy="680941"/>
           </a:xfrm>
           <a:prstGeom prst="straightConnector1">
             <a:avLst/>
@@ -23930,15 +23975,15 @@
         <p:nvCxnSpPr>
           <p:cNvPr id="378" name="Connection Line"/>
           <p:cNvCxnSpPr>
-            <a:stCxn id="364" idx="0"/>
+            <a:stCxn id="367" idx="0"/>
             <a:endCxn id="366" idx="0"/>
           </p:cNvCxnSpPr>
           <p:nvPr/>
         </p:nvCxnSpPr>
         <p:spPr>
-          <a:xfrm flipH="1">
-            <a:off x="8487061" y="3271854"/>
-            <a:ext cx="1346894" cy="1561724"/>
+          <a:xfrm flipV="1">
+            <a:off x="8487061" y="3273702"/>
+            <a:ext cx="2370195" cy="1559876"/>
           </a:xfrm>
           <a:prstGeom prst="straightConnector1">
             <a:avLst/>
@@ -23954,15 +23999,15 @@
         <p:nvCxnSpPr>
           <p:cNvPr id="379" name="Connection Line"/>
           <p:cNvCxnSpPr>
-            <a:stCxn id="366" idx="0"/>
-            <a:endCxn id="363" idx="0"/>
+            <a:stCxn id="365" idx="0"/>
+            <a:endCxn id="367" idx="0"/>
           </p:cNvCxnSpPr>
           <p:nvPr/>
         </p:nvCxnSpPr>
         <p:spPr>
-          <a:xfrm flipV="1">
+          <a:xfrm flipH="1">
             <a:off x="8487061" y="3271854"/>
-            <a:ext cx="1836327" cy="1561724"/>
+            <a:ext cx="1346894" cy="1561724"/>
           </a:xfrm>
           <a:prstGeom prst="straightConnector1">
             <a:avLst/>
@@ -23978,15 +24023,15 @@
         <p:nvCxnSpPr>
           <p:cNvPr id="380" name="Connection Line"/>
           <p:cNvCxnSpPr>
-            <a:stCxn id="366" idx="0"/>
-            <a:endCxn id="362" idx="0"/>
+            <a:stCxn id="367" idx="0"/>
+            <a:endCxn id="364" idx="0"/>
           </p:cNvCxnSpPr>
           <p:nvPr/>
         </p:nvCxnSpPr>
         <p:spPr>
           <a:xfrm flipV="1">
-            <a:off x="8487061" y="3274486"/>
-            <a:ext cx="829046" cy="1559092"/>
+            <a:off x="8487061" y="3271854"/>
+            <a:ext cx="1836327" cy="1561724"/>
           </a:xfrm>
           <a:prstGeom prst="straightConnector1">
             <a:avLst/>
@@ -24002,15 +24047,15 @@
         <p:nvCxnSpPr>
           <p:cNvPr id="381" name="Connection Line"/>
           <p:cNvCxnSpPr>
-            <a:stCxn id="366" idx="0"/>
-            <a:endCxn id="356" idx="0"/>
+            <a:stCxn id="367" idx="0"/>
+            <a:endCxn id="363" idx="0"/>
           </p:cNvCxnSpPr>
           <p:nvPr/>
         </p:nvCxnSpPr>
         <p:spPr>
           <a:xfrm flipV="1">
-            <a:off x="8487061" y="2459347"/>
-            <a:ext cx="603591" cy="2374231"/>
+            <a:off x="8487061" y="3274486"/>
+            <a:ext cx="829046" cy="1559092"/>
           </a:xfrm>
           <a:prstGeom prst="straightConnector1">
             <a:avLst/>
@@ -24026,15 +24071,15 @@
         <p:nvCxnSpPr>
           <p:cNvPr id="382" name="Connection Line"/>
           <p:cNvCxnSpPr>
-            <a:stCxn id="358" idx="0"/>
-            <a:endCxn id="366" idx="0"/>
+            <a:stCxn id="367" idx="0"/>
+            <a:endCxn id="357" idx="0"/>
           </p:cNvCxnSpPr>
           <p:nvPr/>
         </p:nvCxnSpPr>
         <p:spPr>
-          <a:xfrm>
-            <a:off x="7383343" y="3955426"/>
-            <a:ext cx="1103719" cy="878152"/>
+          <a:xfrm flipV="1">
+            <a:off x="8487061" y="2459347"/>
+            <a:ext cx="603591" cy="2374231"/>
           </a:xfrm>
           <a:prstGeom prst="straightConnector1">
             <a:avLst/>
@@ -24050,15 +24095,15 @@
         <p:nvCxnSpPr>
           <p:cNvPr id="383" name="Connection Line"/>
           <p:cNvCxnSpPr>
-            <a:stCxn id="366" idx="0"/>
-            <a:endCxn id="359" idx="0"/>
+            <a:stCxn id="359" idx="0"/>
+            <a:endCxn id="367" idx="0"/>
           </p:cNvCxnSpPr>
           <p:nvPr/>
         </p:nvCxnSpPr>
         <p:spPr>
-          <a:xfrm flipH="1" flipV="1">
-            <a:off x="6940673" y="3970191"/>
-            <a:ext cx="1546389" cy="863387"/>
+          <a:xfrm>
+            <a:off x="7383343" y="3955426"/>
+            <a:ext cx="1103719" cy="878152"/>
           </a:xfrm>
           <a:prstGeom prst="straightConnector1">
             <a:avLst/>
@@ -24074,15 +24119,15 @@
         <p:nvCxnSpPr>
           <p:cNvPr id="384" name="Connection Line"/>
           <p:cNvCxnSpPr>
-            <a:stCxn id="360" idx="0"/>
-            <a:endCxn id="366" idx="0"/>
+            <a:stCxn id="367" idx="0"/>
+            <a:endCxn id="360" idx="0"/>
           </p:cNvCxnSpPr>
           <p:nvPr/>
         </p:nvCxnSpPr>
         <p:spPr>
-          <a:xfrm>
-            <a:off x="6498003" y="3955426"/>
-            <a:ext cx="1989059" cy="878152"/>
+          <a:xfrm flipH="1" flipV="1">
+            <a:off x="6940673" y="3970191"/>
+            <a:ext cx="1546389" cy="863387"/>
           </a:xfrm>
           <a:prstGeom prst="straightConnector1">
             <a:avLst/>
@@ -24098,15 +24143,15 @@
         <p:nvCxnSpPr>
           <p:cNvPr id="385" name="Connection Line"/>
           <p:cNvCxnSpPr>
-            <a:stCxn id="366" idx="0"/>
-            <a:endCxn id="361" idx="0"/>
+            <a:stCxn id="361" idx="0"/>
+            <a:endCxn id="367" idx="0"/>
           </p:cNvCxnSpPr>
           <p:nvPr/>
         </p:nvCxnSpPr>
         <p:spPr>
-          <a:xfrm flipH="1" flipV="1">
-            <a:off x="8267899" y="3967889"/>
-            <a:ext cx="219163" cy="865689"/>
+          <a:xfrm>
+            <a:off x="6498003" y="3955426"/>
+            <a:ext cx="1989059" cy="878152"/>
           </a:xfrm>
           <a:prstGeom prst="straightConnector1">
             <a:avLst/>
@@ -24122,15 +24167,15 @@
         <p:nvCxnSpPr>
           <p:cNvPr id="386" name="Connection Line"/>
           <p:cNvCxnSpPr>
-            <a:stCxn id="357" idx="0"/>
-            <a:endCxn id="366" idx="0"/>
+            <a:stCxn id="367" idx="0"/>
+            <a:endCxn id="362" idx="0"/>
           </p:cNvCxnSpPr>
           <p:nvPr/>
         </p:nvCxnSpPr>
         <p:spPr>
-          <a:xfrm>
-            <a:off x="7389431" y="3274486"/>
-            <a:ext cx="1097631" cy="1559092"/>
+          <a:xfrm flipH="1" flipV="1">
+            <a:off x="8267899" y="3967889"/>
+            <a:ext cx="219163" cy="865689"/>
           </a:xfrm>
           <a:prstGeom prst="straightConnector1">
             <a:avLst/>
@@ -24146,8 +24191,32 @@
         <p:nvCxnSpPr>
           <p:cNvPr id="387" name="Connection Line"/>
           <p:cNvCxnSpPr>
-            <a:stCxn id="355" idx="0"/>
-            <a:endCxn id="366" idx="0"/>
+            <a:stCxn id="358" idx="0"/>
+            <a:endCxn id="367" idx="0"/>
+          </p:cNvCxnSpPr>
+          <p:nvPr/>
+        </p:nvCxnSpPr>
+        <p:spPr>
+          <a:xfrm>
+            <a:off x="7389431" y="3274486"/>
+            <a:ext cx="1097631" cy="1559092"/>
+          </a:xfrm>
+          <a:prstGeom prst="straightConnector1">
+            <a:avLst/>
+          </a:prstGeom>
+          <a:ln w="12700">
+            <a:solidFill>
+              <a:schemeClr val="accent1"/>
+            </a:solidFill>
+          </a:ln>
+        </p:spPr>
+      </p:cxnSp>
+      <p:cxnSp>
+        <p:nvCxnSpPr>
+          <p:cNvPr id="388" name="Connection Line"/>
+          <p:cNvCxnSpPr>
+            <a:stCxn id="356" idx="0"/>
+            <a:endCxn id="367" idx="0"/>
           </p:cNvCxnSpPr>
           <p:nvPr/>
         </p:nvCxnSpPr>
@@ -24168,7 +24237,7 @@
       </p:cxnSp>
       <p:sp>
         <p:nvSpPr>
-          <p:cNvPr id="388" name="Java…"/>
+          <p:cNvPr id="389" name="Java…"/>
           <p:cNvSpPr txBox="1"/>
           <p:nvPr/>
         </p:nvSpPr>
@@ -24208,7 +24277,7 @@
       </p:sp>
       <p:sp>
         <p:nvSpPr>
-          <p:cNvPr id="389" name="Java…"/>
+          <p:cNvPr id="390" name="Java…"/>
           <p:cNvSpPr txBox="1"/>
           <p:nvPr/>
         </p:nvSpPr>
@@ -24248,7 +24317,7 @@
       </p:sp>
       <p:sp>
         <p:nvSpPr>
-          <p:cNvPr id="390" name="Java…"/>
+          <p:cNvPr id="391" name="Java…"/>
           <p:cNvSpPr txBox="1"/>
           <p:nvPr/>
         </p:nvSpPr>
@@ -24288,7 +24357,7 @@
       </p:sp>
       <p:sp>
         <p:nvSpPr>
-          <p:cNvPr id="391" name="Configuration of Containerlab File"/>
+          <p:cNvPr id="392" name="Configuration of Containerlab File"/>
           <p:cNvSpPr txBox="1"/>
           <p:nvPr/>
         </p:nvSpPr>

</xml_diff>